<commit_message>
Session1: Powerpoint and code
</commit_message>
<xml_diff>
--- a/Session1/Getting Started Session 1 - Slides.pptx
+++ b/Session1/Getting Started Session 1 - Slides.pptx
@@ -25,23 +25,29 @@
     <p:sldId id="270" r:id="rId20"/>
     <p:sldId id="271" r:id="rId21"/>
     <p:sldId id="272" r:id="rId22"/>
+    <p:sldId id="273" r:id="rId23"/>
+    <p:sldId id="274" r:id="rId24"/>
+    <p:sldId id="275" r:id="rId25"/>
+    <p:sldId id="276" r:id="rId26"/>
+    <p:sldId id="277" r:id="rId27"/>
+    <p:sldId id="278" r:id="rId28"/>
   </p:sldIdLst>
   <p:sldSz cy="5143500" cx="9144000"/>
   <p:notesSz cx="6858000" cy="9144000"/>
   <p:embeddedFontLst>
     <p:embeddedFont>
       <p:font typeface="Raleway"/>
-      <p:regular r:id="rId23"/>
-      <p:bold r:id="rId24"/>
-      <p:italic r:id="rId25"/>
-      <p:boldItalic r:id="rId26"/>
+      <p:regular r:id="rId29"/>
+      <p:bold r:id="rId30"/>
+      <p:italic r:id="rId31"/>
+      <p:boldItalic r:id="rId32"/>
     </p:embeddedFont>
     <p:embeddedFont>
       <p:font typeface="Lato"/>
-      <p:regular r:id="rId27"/>
-      <p:bold r:id="rId28"/>
-      <p:italic r:id="rId29"/>
-      <p:boldItalic r:id="rId30"/>
+      <p:regular r:id="rId33"/>
+      <p:bold r:id="rId34"/>
+      <p:italic r:id="rId35"/>
+      <p:boldItalic r:id="rId36"/>
     </p:embeddedFont>
   </p:embeddedFontLst>
   <p:defaultTextStyle>
@@ -921,7 +927,7 @@
   <p:cSld>
     <p:spTree>
       <p:nvGrpSpPr>
-        <p:cNvPr id="144" name="Shape 144"/>
+        <p:cNvPr id="147" name="Shape 147"/>
         <p:cNvGrpSpPr/>
         <p:nvPr/>
       </p:nvGrpSpPr>
@@ -935,7 +941,7 @@
       </p:grpSpPr>
       <p:sp>
         <p:nvSpPr>
-          <p:cNvPr id="145" name="Google Shape;145;gdc3cedfbf4_0_306:notes"/>
+          <p:cNvPr id="148" name="Google Shape;148;gdfa8c61da5_0_4:notes"/>
           <p:cNvSpPr/>
           <p:nvPr>
             <p:ph idx="2" type="sldImg"/>
@@ -970,7 +976,7 @@
       </p:sp>
       <p:sp>
         <p:nvSpPr>
-          <p:cNvPr id="146" name="Google Shape;146;gdc3cedfbf4_0_306:notes"/>
+          <p:cNvPr id="149" name="Google Shape;149;gdfa8c61da5_0_4:notes"/>
           <p:cNvSpPr txBox="1"/>
           <p:nvPr>
             <p:ph idx="1" type="body"/>
@@ -1020,7 +1026,7 @@
   <p:cSld>
     <p:spTree>
       <p:nvGrpSpPr>
-        <p:cNvPr id="151" name="Shape 151"/>
+        <p:cNvPr id="155" name="Shape 155"/>
         <p:cNvGrpSpPr/>
         <p:nvPr/>
       </p:nvGrpSpPr>
@@ -1034,7 +1040,7 @@
       </p:grpSpPr>
       <p:sp>
         <p:nvSpPr>
-          <p:cNvPr id="152" name="Google Shape;152;gdc3cedfbf4_0_312:notes"/>
+          <p:cNvPr id="156" name="Google Shape;156;gdc3cedfbf4_0_306:notes"/>
           <p:cNvSpPr/>
           <p:nvPr>
             <p:ph idx="2" type="sldImg"/>
@@ -1069,7 +1075,7 @@
       </p:sp>
       <p:sp>
         <p:nvSpPr>
-          <p:cNvPr id="153" name="Google Shape;153;gdc3cedfbf4_0_312:notes"/>
+          <p:cNvPr id="157" name="Google Shape;157;gdc3cedfbf4_0_306:notes"/>
           <p:cNvSpPr txBox="1"/>
           <p:nvPr>
             <p:ph idx="1" type="body"/>
@@ -1119,7 +1125,7 @@
   <p:cSld>
     <p:spTree>
       <p:nvGrpSpPr>
-        <p:cNvPr id="157" name="Shape 157"/>
+        <p:cNvPr id="162" name="Shape 162"/>
         <p:cNvGrpSpPr/>
         <p:nvPr/>
       </p:nvGrpSpPr>
@@ -1133,7 +1139,7 @@
       </p:grpSpPr>
       <p:sp>
         <p:nvSpPr>
-          <p:cNvPr id="158" name="Google Shape;158;gdc3cedfbf4_0_317:notes"/>
+          <p:cNvPr id="163" name="Google Shape;163;gdfa8c61da5_0_13:notes"/>
           <p:cNvSpPr/>
           <p:nvPr>
             <p:ph idx="2" type="sldImg"/>
@@ -1168,7 +1174,7 @@
       </p:sp>
       <p:sp>
         <p:nvSpPr>
-          <p:cNvPr id="159" name="Google Shape;159;gdc3cedfbf4_0_317:notes"/>
+          <p:cNvPr id="164" name="Google Shape;164;gdfa8c61da5_0_13:notes"/>
           <p:cNvSpPr txBox="1"/>
           <p:nvPr>
             <p:ph idx="1" type="body"/>
@@ -1218,7 +1224,7 @@
   <p:cSld>
     <p:spTree>
       <p:nvGrpSpPr>
-        <p:cNvPr id="164" name="Shape 164"/>
+        <p:cNvPr id="171" name="Shape 171"/>
         <p:cNvGrpSpPr/>
         <p:nvPr/>
       </p:nvGrpSpPr>
@@ -1232,7 +1238,7 @@
       </p:grpSpPr>
       <p:sp>
         <p:nvSpPr>
-          <p:cNvPr id="165" name="Google Shape;165;gdc3cedfbf4_0_323:notes"/>
+          <p:cNvPr id="172" name="Google Shape;172;gdfa8c61da5_0_24:notes"/>
           <p:cNvSpPr/>
           <p:nvPr>
             <p:ph idx="2" type="sldImg"/>
@@ -1267,7 +1273,7 @@
       </p:sp>
       <p:sp>
         <p:nvSpPr>
-          <p:cNvPr id="166" name="Google Shape;166;gdc3cedfbf4_0_323:notes"/>
+          <p:cNvPr id="173" name="Google Shape;173;gdfa8c61da5_0_24:notes"/>
           <p:cNvSpPr txBox="1"/>
           <p:nvPr>
             <p:ph idx="1" type="body"/>
@@ -1317,7 +1323,7 @@
   <p:cSld>
     <p:spTree>
       <p:nvGrpSpPr>
-        <p:cNvPr id="170" name="Shape 170"/>
+        <p:cNvPr id="177" name="Shape 177"/>
         <p:cNvGrpSpPr/>
         <p:nvPr/>
       </p:nvGrpSpPr>
@@ -1331,7 +1337,7 @@
       </p:grpSpPr>
       <p:sp>
         <p:nvSpPr>
-          <p:cNvPr id="171" name="Google Shape;171;gdc3cedfbf4_0_333:notes"/>
+          <p:cNvPr id="178" name="Google Shape;178;gdfa8c61da5_0_31:notes"/>
           <p:cNvSpPr/>
           <p:nvPr>
             <p:ph idx="2" type="sldImg"/>
@@ -1366,7 +1372,7 @@
       </p:sp>
       <p:sp>
         <p:nvSpPr>
-          <p:cNvPr id="172" name="Google Shape;172;gdc3cedfbf4_0_333:notes"/>
+          <p:cNvPr id="179" name="Google Shape;179;gdfa8c61da5_0_31:notes"/>
           <p:cNvSpPr txBox="1"/>
           <p:nvPr>
             <p:ph idx="1" type="body"/>
@@ -1416,7 +1422,7 @@
   <p:cSld>
     <p:spTree>
       <p:nvGrpSpPr>
-        <p:cNvPr id="176" name="Shape 176"/>
+        <p:cNvPr id="185" name="Shape 185"/>
         <p:cNvGrpSpPr/>
         <p:nvPr/>
       </p:nvGrpSpPr>
@@ -1430,7 +1436,7 @@
       </p:grpSpPr>
       <p:sp>
         <p:nvSpPr>
-          <p:cNvPr id="177" name="Google Shape;177;gdc3cedfbf4_0_328:notes"/>
+          <p:cNvPr id="186" name="Google Shape;186;gdc3cedfbf4_0_312:notes"/>
           <p:cNvSpPr/>
           <p:nvPr>
             <p:ph idx="2" type="sldImg"/>
@@ -1465,7 +1471,7 @@
       </p:sp>
       <p:sp>
         <p:nvSpPr>
-          <p:cNvPr id="178" name="Google Shape;178;gdc3cedfbf4_0_328:notes"/>
+          <p:cNvPr id="187" name="Google Shape;187;gdc3cedfbf4_0_312:notes"/>
           <p:cNvSpPr txBox="1"/>
           <p:nvPr>
             <p:ph idx="1" type="body"/>
@@ -1515,7 +1521,7 @@
   <p:cSld>
     <p:spTree>
       <p:nvGrpSpPr>
-        <p:cNvPr id="182" name="Shape 182"/>
+        <p:cNvPr id="191" name="Shape 191"/>
         <p:cNvGrpSpPr/>
         <p:nvPr/>
       </p:nvGrpSpPr>
@@ -1529,7 +1535,7 @@
       </p:grpSpPr>
       <p:sp>
         <p:nvSpPr>
-          <p:cNvPr id="183" name="Google Shape;183;gdc3cedfbf4_0_338:notes"/>
+          <p:cNvPr id="192" name="Google Shape;192;gdfa8c61da5_0_40:notes"/>
           <p:cNvSpPr/>
           <p:nvPr>
             <p:ph idx="2" type="sldImg"/>
@@ -1564,7 +1570,205 @@
       </p:sp>
       <p:sp>
         <p:nvSpPr>
-          <p:cNvPr id="184" name="Google Shape;184;gdc3cedfbf4_0_338:notes"/>
+          <p:cNvPr id="193" name="Google Shape;193;gdfa8c61da5_0_40:notes"/>
+          <p:cNvSpPr txBox="1"/>
+          <p:nvPr>
+            <p:ph idx="1" type="body"/>
+          </p:nvPr>
+        </p:nvSpPr>
+        <p:spPr>
+          <a:xfrm>
+            <a:off x="685800" y="4343400"/>
+            <a:ext cx="5486400" cy="4114800"/>
+          </a:xfrm>
+          <a:prstGeom prst="rect">
+            <a:avLst/>
+          </a:prstGeom>
+        </p:spPr>
+        <p:txBody>
+          <a:bodyPr anchorCtr="0" anchor="t" bIns="91425" lIns="91425" spcFirstLastPara="1" rIns="91425" wrap="square" tIns="91425">
+            <a:noAutofit/>
+          </a:bodyPr>
+          <a:lstStyle/>
+          <a:p>
+            <a:pPr indent="0" lvl="0" marL="0" rtl="0" algn="l">
+              <a:spcBef>
+                <a:spcPts val="0"/>
+              </a:spcBef>
+              <a:spcAft>
+                <a:spcPts val="0"/>
+              </a:spcAft>
+              <a:buNone/>
+            </a:pPr>
+            <a:r>
+              <a:t/>
+            </a:r>
+            <a:endParaRPr/>
+          </a:p>
+        </p:txBody>
+      </p:sp>
+    </p:spTree>
+  </p:cSld>
+  <p:clrMapOvr>
+    <a:masterClrMapping/>
+  </p:clrMapOvr>
+</p:notes>
+</file>
+
+<file path=ppt/notesSlides/notesSlide18.xml><?xml version="1.0" encoding="utf-8"?>
+<p:notes xmlns:a="http://schemas.openxmlformats.org/drawingml/2006/main" xmlns:r="http://schemas.openxmlformats.org/officeDocument/2006/relationships" xmlns:mc="http://schemas.openxmlformats.org/markup-compatibility/2006" xmlns:mv="urn:schemas-microsoft-com:mac:vml" xmlns:p="http://schemas.openxmlformats.org/presentationml/2006/main" xmlns:c="http://schemas.openxmlformats.org/drawingml/2006/chart" xmlns:dgm="http://schemas.openxmlformats.org/drawingml/2006/diagram" xmlns:o="urn:schemas-microsoft-com:office:office" xmlns:v="urn:schemas-microsoft-com:vml" xmlns:pvml="urn:schemas-microsoft-com:office:powerpoint" xmlns:com="http://schemas.openxmlformats.org/drawingml/2006/compatibility" xmlns:p14="http://schemas.microsoft.com/office/powerpoint/2010/main" xmlns:p15="http://schemas.microsoft.com/office/powerpoint/2012/main" xmlns:ahyp="http://schemas.microsoft.com/office/drawing/2018/hyperlinkcolor" showMasterPhAnim="0" showMasterSp="0">
+  <p:cSld>
+    <p:spTree>
+      <p:nvGrpSpPr>
+        <p:cNvPr id="198" name="Shape 198"/>
+        <p:cNvGrpSpPr/>
+        <p:nvPr/>
+      </p:nvGrpSpPr>
+      <p:grpSpPr>
+        <a:xfrm>
+          <a:off x="0" y="0"/>
+          <a:ext cx="0" cy="0"/>
+          <a:chOff x="0" y="0"/>
+          <a:chExt cx="0" cy="0"/>
+        </a:xfrm>
+      </p:grpSpPr>
+      <p:sp>
+        <p:nvSpPr>
+          <p:cNvPr id="199" name="Google Shape;199;gdfa8c61da5_0_48:notes"/>
+          <p:cNvSpPr/>
+          <p:nvPr>
+            <p:ph idx="2" type="sldImg"/>
+          </p:nvPr>
+        </p:nvSpPr>
+        <p:spPr>
+          <a:xfrm>
+            <a:off x="381300" y="685800"/>
+            <a:ext cx="6096000" cy="3429000"/>
+          </a:xfrm>
+          <a:custGeom>
+            <a:rect b="b" l="l" r="r" t="t"/>
+            <a:pathLst>
+              <a:path extrusionOk="0" h="120000" w="120000">
+                <a:moveTo>
+                  <a:pt x="0" y="0"/>
+                </a:moveTo>
+                <a:lnTo>
+                  <a:pt x="120000" y="0"/>
+                </a:lnTo>
+                <a:lnTo>
+                  <a:pt x="120000" y="120000"/>
+                </a:lnTo>
+                <a:lnTo>
+                  <a:pt x="0" y="120000"/>
+                </a:lnTo>
+                <a:close/>
+              </a:path>
+            </a:pathLst>
+          </a:custGeom>
+        </p:spPr>
+      </p:sp>
+      <p:sp>
+        <p:nvSpPr>
+          <p:cNvPr id="200" name="Google Shape;200;gdfa8c61da5_0_48:notes"/>
+          <p:cNvSpPr txBox="1"/>
+          <p:nvPr>
+            <p:ph idx="1" type="body"/>
+          </p:nvPr>
+        </p:nvSpPr>
+        <p:spPr>
+          <a:xfrm>
+            <a:off x="685800" y="4343400"/>
+            <a:ext cx="5486400" cy="4114800"/>
+          </a:xfrm>
+          <a:prstGeom prst="rect">
+            <a:avLst/>
+          </a:prstGeom>
+        </p:spPr>
+        <p:txBody>
+          <a:bodyPr anchorCtr="0" anchor="t" bIns="91425" lIns="91425" spcFirstLastPara="1" rIns="91425" wrap="square" tIns="91425">
+            <a:noAutofit/>
+          </a:bodyPr>
+          <a:lstStyle/>
+          <a:p>
+            <a:pPr indent="0" lvl="0" marL="0" rtl="0" algn="l">
+              <a:spcBef>
+                <a:spcPts val="0"/>
+              </a:spcBef>
+              <a:spcAft>
+                <a:spcPts val="0"/>
+              </a:spcAft>
+              <a:buNone/>
+            </a:pPr>
+            <a:r>
+              <a:t/>
+            </a:r>
+            <a:endParaRPr/>
+          </a:p>
+        </p:txBody>
+      </p:sp>
+    </p:spTree>
+  </p:cSld>
+  <p:clrMapOvr>
+    <a:masterClrMapping/>
+  </p:clrMapOvr>
+</p:notes>
+</file>
+
+<file path=ppt/notesSlides/notesSlide19.xml><?xml version="1.0" encoding="utf-8"?>
+<p:notes xmlns:a="http://schemas.openxmlformats.org/drawingml/2006/main" xmlns:r="http://schemas.openxmlformats.org/officeDocument/2006/relationships" xmlns:mc="http://schemas.openxmlformats.org/markup-compatibility/2006" xmlns:mv="urn:schemas-microsoft-com:mac:vml" xmlns:p="http://schemas.openxmlformats.org/presentationml/2006/main" xmlns:c="http://schemas.openxmlformats.org/drawingml/2006/chart" xmlns:dgm="http://schemas.openxmlformats.org/drawingml/2006/diagram" xmlns:o="urn:schemas-microsoft-com:office:office" xmlns:v="urn:schemas-microsoft-com:vml" xmlns:pvml="urn:schemas-microsoft-com:office:powerpoint" xmlns:com="http://schemas.openxmlformats.org/drawingml/2006/compatibility" xmlns:p14="http://schemas.microsoft.com/office/powerpoint/2010/main" xmlns:p15="http://schemas.microsoft.com/office/powerpoint/2012/main" xmlns:ahyp="http://schemas.microsoft.com/office/drawing/2018/hyperlinkcolor" showMasterPhAnim="0" showMasterSp="0">
+  <p:cSld>
+    <p:spTree>
+      <p:nvGrpSpPr>
+        <p:cNvPr id="205" name="Shape 205"/>
+        <p:cNvGrpSpPr/>
+        <p:nvPr/>
+      </p:nvGrpSpPr>
+      <p:grpSpPr>
+        <a:xfrm>
+          <a:off x="0" y="0"/>
+          <a:ext cx="0" cy="0"/>
+          <a:chOff x="0" y="0"/>
+          <a:chExt cx="0" cy="0"/>
+        </a:xfrm>
+      </p:grpSpPr>
+      <p:sp>
+        <p:nvSpPr>
+          <p:cNvPr id="206" name="Google Shape;206;gdc3cedfbf4_0_317:notes"/>
+          <p:cNvSpPr/>
+          <p:nvPr>
+            <p:ph idx="2" type="sldImg"/>
+          </p:nvPr>
+        </p:nvSpPr>
+        <p:spPr>
+          <a:xfrm>
+            <a:off x="381300" y="685800"/>
+            <a:ext cx="6096000" cy="3429000"/>
+          </a:xfrm>
+          <a:custGeom>
+            <a:rect b="b" l="l" r="r" t="t"/>
+            <a:pathLst>
+              <a:path extrusionOk="0" h="120000" w="120000">
+                <a:moveTo>
+                  <a:pt x="0" y="0"/>
+                </a:moveTo>
+                <a:lnTo>
+                  <a:pt x="120000" y="0"/>
+                </a:lnTo>
+                <a:lnTo>
+                  <a:pt x="120000" y="120000"/>
+                </a:lnTo>
+                <a:lnTo>
+                  <a:pt x="0" y="120000"/>
+                </a:lnTo>
+                <a:close/>
+              </a:path>
+            </a:pathLst>
+          </a:custGeom>
+        </p:spPr>
+      </p:sp>
+      <p:sp>
+        <p:nvSpPr>
+          <p:cNvPr id="207" name="Google Shape;207;gdc3cedfbf4_0_317:notes"/>
           <p:cNvSpPr txBox="1"/>
           <p:nvPr>
             <p:ph idx="1" type="body"/>
@@ -1664,6 +1868,402 @@
       <p:sp>
         <p:nvSpPr>
           <p:cNvPr id="90" name="Google Shape;90;gdc3cedfbf4_0_255:notes"/>
+          <p:cNvSpPr txBox="1"/>
+          <p:nvPr>
+            <p:ph idx="1" type="body"/>
+          </p:nvPr>
+        </p:nvSpPr>
+        <p:spPr>
+          <a:xfrm>
+            <a:off x="685800" y="4343400"/>
+            <a:ext cx="5486400" cy="4114800"/>
+          </a:xfrm>
+          <a:prstGeom prst="rect">
+            <a:avLst/>
+          </a:prstGeom>
+        </p:spPr>
+        <p:txBody>
+          <a:bodyPr anchorCtr="0" anchor="t" bIns="91425" lIns="91425" spcFirstLastPara="1" rIns="91425" wrap="square" tIns="91425">
+            <a:noAutofit/>
+          </a:bodyPr>
+          <a:lstStyle/>
+          <a:p>
+            <a:pPr indent="0" lvl="0" marL="0" rtl="0" algn="l">
+              <a:spcBef>
+                <a:spcPts val="0"/>
+              </a:spcBef>
+              <a:spcAft>
+                <a:spcPts val="0"/>
+              </a:spcAft>
+              <a:buNone/>
+            </a:pPr>
+            <a:r>
+              <a:t/>
+            </a:r>
+            <a:endParaRPr/>
+          </a:p>
+        </p:txBody>
+      </p:sp>
+    </p:spTree>
+  </p:cSld>
+  <p:clrMapOvr>
+    <a:masterClrMapping/>
+  </p:clrMapOvr>
+</p:notes>
+</file>
+
+<file path=ppt/notesSlides/notesSlide20.xml><?xml version="1.0" encoding="utf-8"?>
+<p:notes xmlns:a="http://schemas.openxmlformats.org/drawingml/2006/main" xmlns:r="http://schemas.openxmlformats.org/officeDocument/2006/relationships" xmlns:mc="http://schemas.openxmlformats.org/markup-compatibility/2006" xmlns:mv="urn:schemas-microsoft-com:mac:vml" xmlns:p="http://schemas.openxmlformats.org/presentationml/2006/main" xmlns:c="http://schemas.openxmlformats.org/drawingml/2006/chart" xmlns:dgm="http://schemas.openxmlformats.org/drawingml/2006/diagram" xmlns:o="urn:schemas-microsoft-com:office:office" xmlns:v="urn:schemas-microsoft-com:vml" xmlns:pvml="urn:schemas-microsoft-com:office:powerpoint" xmlns:com="http://schemas.openxmlformats.org/drawingml/2006/compatibility" xmlns:p14="http://schemas.microsoft.com/office/powerpoint/2010/main" xmlns:p15="http://schemas.microsoft.com/office/powerpoint/2012/main" xmlns:ahyp="http://schemas.microsoft.com/office/drawing/2018/hyperlinkcolor" showMasterPhAnim="0" showMasterSp="0">
+  <p:cSld>
+    <p:spTree>
+      <p:nvGrpSpPr>
+        <p:cNvPr id="212" name="Shape 212"/>
+        <p:cNvGrpSpPr/>
+        <p:nvPr/>
+      </p:nvGrpSpPr>
+      <p:grpSpPr>
+        <a:xfrm>
+          <a:off x="0" y="0"/>
+          <a:ext cx="0" cy="0"/>
+          <a:chOff x="0" y="0"/>
+          <a:chExt cx="0" cy="0"/>
+        </a:xfrm>
+      </p:grpSpPr>
+      <p:sp>
+        <p:nvSpPr>
+          <p:cNvPr id="213" name="Google Shape;213;gdc3cedfbf4_0_323:notes"/>
+          <p:cNvSpPr/>
+          <p:nvPr>
+            <p:ph idx="2" type="sldImg"/>
+          </p:nvPr>
+        </p:nvSpPr>
+        <p:spPr>
+          <a:xfrm>
+            <a:off x="381300" y="685800"/>
+            <a:ext cx="6096000" cy="3429000"/>
+          </a:xfrm>
+          <a:custGeom>
+            <a:rect b="b" l="l" r="r" t="t"/>
+            <a:pathLst>
+              <a:path extrusionOk="0" h="120000" w="120000">
+                <a:moveTo>
+                  <a:pt x="0" y="0"/>
+                </a:moveTo>
+                <a:lnTo>
+                  <a:pt x="120000" y="0"/>
+                </a:lnTo>
+                <a:lnTo>
+                  <a:pt x="120000" y="120000"/>
+                </a:lnTo>
+                <a:lnTo>
+                  <a:pt x="0" y="120000"/>
+                </a:lnTo>
+                <a:close/>
+              </a:path>
+            </a:pathLst>
+          </a:custGeom>
+        </p:spPr>
+      </p:sp>
+      <p:sp>
+        <p:nvSpPr>
+          <p:cNvPr id="214" name="Google Shape;214;gdc3cedfbf4_0_323:notes"/>
+          <p:cNvSpPr txBox="1"/>
+          <p:nvPr>
+            <p:ph idx="1" type="body"/>
+          </p:nvPr>
+        </p:nvSpPr>
+        <p:spPr>
+          <a:xfrm>
+            <a:off x="685800" y="4343400"/>
+            <a:ext cx="5486400" cy="4114800"/>
+          </a:xfrm>
+          <a:prstGeom prst="rect">
+            <a:avLst/>
+          </a:prstGeom>
+        </p:spPr>
+        <p:txBody>
+          <a:bodyPr anchorCtr="0" anchor="t" bIns="91425" lIns="91425" spcFirstLastPara="1" rIns="91425" wrap="square" tIns="91425">
+            <a:noAutofit/>
+          </a:bodyPr>
+          <a:lstStyle/>
+          <a:p>
+            <a:pPr indent="0" lvl="0" marL="0" rtl="0" algn="l">
+              <a:spcBef>
+                <a:spcPts val="0"/>
+              </a:spcBef>
+              <a:spcAft>
+                <a:spcPts val="0"/>
+              </a:spcAft>
+              <a:buNone/>
+            </a:pPr>
+            <a:r>
+              <a:t/>
+            </a:r>
+            <a:endParaRPr/>
+          </a:p>
+        </p:txBody>
+      </p:sp>
+    </p:spTree>
+  </p:cSld>
+  <p:clrMapOvr>
+    <a:masterClrMapping/>
+  </p:clrMapOvr>
+</p:notes>
+</file>
+
+<file path=ppt/notesSlides/notesSlide21.xml><?xml version="1.0" encoding="utf-8"?>
+<p:notes xmlns:a="http://schemas.openxmlformats.org/drawingml/2006/main" xmlns:r="http://schemas.openxmlformats.org/officeDocument/2006/relationships" xmlns:mc="http://schemas.openxmlformats.org/markup-compatibility/2006" xmlns:mv="urn:schemas-microsoft-com:mac:vml" xmlns:p="http://schemas.openxmlformats.org/presentationml/2006/main" xmlns:c="http://schemas.openxmlformats.org/drawingml/2006/chart" xmlns:dgm="http://schemas.openxmlformats.org/drawingml/2006/diagram" xmlns:o="urn:schemas-microsoft-com:office:office" xmlns:v="urn:schemas-microsoft-com:vml" xmlns:pvml="urn:schemas-microsoft-com:office:powerpoint" xmlns:com="http://schemas.openxmlformats.org/drawingml/2006/compatibility" xmlns:p14="http://schemas.microsoft.com/office/powerpoint/2010/main" xmlns:p15="http://schemas.microsoft.com/office/powerpoint/2012/main" xmlns:ahyp="http://schemas.microsoft.com/office/drawing/2018/hyperlinkcolor" showMasterPhAnim="0" showMasterSp="0">
+  <p:cSld>
+    <p:spTree>
+      <p:nvGrpSpPr>
+        <p:cNvPr id="218" name="Shape 218"/>
+        <p:cNvGrpSpPr/>
+        <p:nvPr/>
+      </p:nvGrpSpPr>
+      <p:grpSpPr>
+        <a:xfrm>
+          <a:off x="0" y="0"/>
+          <a:ext cx="0" cy="0"/>
+          <a:chOff x="0" y="0"/>
+          <a:chExt cx="0" cy="0"/>
+        </a:xfrm>
+      </p:grpSpPr>
+      <p:sp>
+        <p:nvSpPr>
+          <p:cNvPr id="219" name="Google Shape;219;gdc3cedfbf4_0_333:notes"/>
+          <p:cNvSpPr/>
+          <p:nvPr>
+            <p:ph idx="2" type="sldImg"/>
+          </p:nvPr>
+        </p:nvSpPr>
+        <p:spPr>
+          <a:xfrm>
+            <a:off x="381300" y="685800"/>
+            <a:ext cx="6096000" cy="3429000"/>
+          </a:xfrm>
+          <a:custGeom>
+            <a:rect b="b" l="l" r="r" t="t"/>
+            <a:pathLst>
+              <a:path extrusionOk="0" h="120000" w="120000">
+                <a:moveTo>
+                  <a:pt x="0" y="0"/>
+                </a:moveTo>
+                <a:lnTo>
+                  <a:pt x="120000" y="0"/>
+                </a:lnTo>
+                <a:lnTo>
+                  <a:pt x="120000" y="120000"/>
+                </a:lnTo>
+                <a:lnTo>
+                  <a:pt x="0" y="120000"/>
+                </a:lnTo>
+                <a:close/>
+              </a:path>
+            </a:pathLst>
+          </a:custGeom>
+        </p:spPr>
+      </p:sp>
+      <p:sp>
+        <p:nvSpPr>
+          <p:cNvPr id="220" name="Google Shape;220;gdc3cedfbf4_0_333:notes"/>
+          <p:cNvSpPr txBox="1"/>
+          <p:nvPr>
+            <p:ph idx="1" type="body"/>
+          </p:nvPr>
+        </p:nvSpPr>
+        <p:spPr>
+          <a:xfrm>
+            <a:off x="685800" y="4343400"/>
+            <a:ext cx="5486400" cy="4114800"/>
+          </a:xfrm>
+          <a:prstGeom prst="rect">
+            <a:avLst/>
+          </a:prstGeom>
+        </p:spPr>
+        <p:txBody>
+          <a:bodyPr anchorCtr="0" anchor="t" bIns="91425" lIns="91425" spcFirstLastPara="1" rIns="91425" wrap="square" tIns="91425">
+            <a:noAutofit/>
+          </a:bodyPr>
+          <a:lstStyle/>
+          <a:p>
+            <a:pPr indent="0" lvl="0" marL="0" rtl="0" algn="l">
+              <a:spcBef>
+                <a:spcPts val="0"/>
+              </a:spcBef>
+              <a:spcAft>
+                <a:spcPts val="0"/>
+              </a:spcAft>
+              <a:buNone/>
+            </a:pPr>
+            <a:r>
+              <a:t/>
+            </a:r>
+            <a:endParaRPr/>
+          </a:p>
+        </p:txBody>
+      </p:sp>
+    </p:spTree>
+  </p:cSld>
+  <p:clrMapOvr>
+    <a:masterClrMapping/>
+  </p:clrMapOvr>
+</p:notes>
+</file>
+
+<file path=ppt/notesSlides/notesSlide22.xml><?xml version="1.0" encoding="utf-8"?>
+<p:notes xmlns:a="http://schemas.openxmlformats.org/drawingml/2006/main" xmlns:r="http://schemas.openxmlformats.org/officeDocument/2006/relationships" xmlns:mc="http://schemas.openxmlformats.org/markup-compatibility/2006" xmlns:mv="urn:schemas-microsoft-com:mac:vml" xmlns:p="http://schemas.openxmlformats.org/presentationml/2006/main" xmlns:c="http://schemas.openxmlformats.org/drawingml/2006/chart" xmlns:dgm="http://schemas.openxmlformats.org/drawingml/2006/diagram" xmlns:o="urn:schemas-microsoft-com:office:office" xmlns:v="urn:schemas-microsoft-com:vml" xmlns:pvml="urn:schemas-microsoft-com:office:powerpoint" xmlns:com="http://schemas.openxmlformats.org/drawingml/2006/compatibility" xmlns:p14="http://schemas.microsoft.com/office/powerpoint/2010/main" xmlns:p15="http://schemas.microsoft.com/office/powerpoint/2012/main" xmlns:ahyp="http://schemas.microsoft.com/office/drawing/2018/hyperlinkcolor" showMasterPhAnim="0" showMasterSp="0">
+  <p:cSld>
+    <p:spTree>
+      <p:nvGrpSpPr>
+        <p:cNvPr id="224" name="Shape 224"/>
+        <p:cNvGrpSpPr/>
+        <p:nvPr/>
+      </p:nvGrpSpPr>
+      <p:grpSpPr>
+        <a:xfrm>
+          <a:off x="0" y="0"/>
+          <a:ext cx="0" cy="0"/>
+          <a:chOff x="0" y="0"/>
+          <a:chExt cx="0" cy="0"/>
+        </a:xfrm>
+      </p:grpSpPr>
+      <p:sp>
+        <p:nvSpPr>
+          <p:cNvPr id="225" name="Google Shape;225;gdc3cedfbf4_0_328:notes"/>
+          <p:cNvSpPr/>
+          <p:nvPr>
+            <p:ph idx="2" type="sldImg"/>
+          </p:nvPr>
+        </p:nvSpPr>
+        <p:spPr>
+          <a:xfrm>
+            <a:off x="381300" y="685800"/>
+            <a:ext cx="6096000" cy="3429000"/>
+          </a:xfrm>
+          <a:custGeom>
+            <a:rect b="b" l="l" r="r" t="t"/>
+            <a:pathLst>
+              <a:path extrusionOk="0" h="120000" w="120000">
+                <a:moveTo>
+                  <a:pt x="0" y="0"/>
+                </a:moveTo>
+                <a:lnTo>
+                  <a:pt x="120000" y="0"/>
+                </a:lnTo>
+                <a:lnTo>
+                  <a:pt x="120000" y="120000"/>
+                </a:lnTo>
+                <a:lnTo>
+                  <a:pt x="0" y="120000"/>
+                </a:lnTo>
+                <a:close/>
+              </a:path>
+            </a:pathLst>
+          </a:custGeom>
+        </p:spPr>
+      </p:sp>
+      <p:sp>
+        <p:nvSpPr>
+          <p:cNvPr id="226" name="Google Shape;226;gdc3cedfbf4_0_328:notes"/>
+          <p:cNvSpPr txBox="1"/>
+          <p:nvPr>
+            <p:ph idx="1" type="body"/>
+          </p:nvPr>
+        </p:nvSpPr>
+        <p:spPr>
+          <a:xfrm>
+            <a:off x="685800" y="4343400"/>
+            <a:ext cx="5486400" cy="4114800"/>
+          </a:xfrm>
+          <a:prstGeom prst="rect">
+            <a:avLst/>
+          </a:prstGeom>
+        </p:spPr>
+        <p:txBody>
+          <a:bodyPr anchorCtr="0" anchor="t" bIns="91425" lIns="91425" spcFirstLastPara="1" rIns="91425" wrap="square" tIns="91425">
+            <a:noAutofit/>
+          </a:bodyPr>
+          <a:lstStyle/>
+          <a:p>
+            <a:pPr indent="0" lvl="0" marL="0" rtl="0" algn="l">
+              <a:spcBef>
+                <a:spcPts val="0"/>
+              </a:spcBef>
+              <a:spcAft>
+                <a:spcPts val="0"/>
+              </a:spcAft>
+              <a:buNone/>
+            </a:pPr>
+            <a:r>
+              <a:t/>
+            </a:r>
+            <a:endParaRPr/>
+          </a:p>
+        </p:txBody>
+      </p:sp>
+    </p:spTree>
+  </p:cSld>
+  <p:clrMapOvr>
+    <a:masterClrMapping/>
+  </p:clrMapOvr>
+</p:notes>
+</file>
+
+<file path=ppt/notesSlides/notesSlide23.xml><?xml version="1.0" encoding="utf-8"?>
+<p:notes xmlns:a="http://schemas.openxmlformats.org/drawingml/2006/main" xmlns:r="http://schemas.openxmlformats.org/officeDocument/2006/relationships" xmlns:mc="http://schemas.openxmlformats.org/markup-compatibility/2006" xmlns:mv="urn:schemas-microsoft-com:mac:vml" xmlns:p="http://schemas.openxmlformats.org/presentationml/2006/main" xmlns:c="http://schemas.openxmlformats.org/drawingml/2006/chart" xmlns:dgm="http://schemas.openxmlformats.org/drawingml/2006/diagram" xmlns:o="urn:schemas-microsoft-com:office:office" xmlns:v="urn:schemas-microsoft-com:vml" xmlns:pvml="urn:schemas-microsoft-com:office:powerpoint" xmlns:com="http://schemas.openxmlformats.org/drawingml/2006/compatibility" xmlns:p14="http://schemas.microsoft.com/office/powerpoint/2010/main" xmlns:p15="http://schemas.microsoft.com/office/powerpoint/2012/main" xmlns:ahyp="http://schemas.microsoft.com/office/drawing/2018/hyperlinkcolor" showMasterPhAnim="0" showMasterSp="0">
+  <p:cSld>
+    <p:spTree>
+      <p:nvGrpSpPr>
+        <p:cNvPr id="230" name="Shape 230"/>
+        <p:cNvGrpSpPr/>
+        <p:nvPr/>
+      </p:nvGrpSpPr>
+      <p:grpSpPr>
+        <a:xfrm>
+          <a:off x="0" y="0"/>
+          <a:ext cx="0" cy="0"/>
+          <a:chOff x="0" y="0"/>
+          <a:chExt cx="0" cy="0"/>
+        </a:xfrm>
+      </p:grpSpPr>
+      <p:sp>
+        <p:nvSpPr>
+          <p:cNvPr id="231" name="Google Shape;231;gdc3cedfbf4_0_338:notes"/>
+          <p:cNvSpPr/>
+          <p:nvPr>
+            <p:ph idx="2" type="sldImg"/>
+          </p:nvPr>
+        </p:nvSpPr>
+        <p:spPr>
+          <a:xfrm>
+            <a:off x="381300" y="685800"/>
+            <a:ext cx="6096000" cy="3429000"/>
+          </a:xfrm>
+          <a:custGeom>
+            <a:rect b="b" l="l" r="r" t="t"/>
+            <a:pathLst>
+              <a:path extrusionOk="0" h="120000" w="120000">
+                <a:moveTo>
+                  <a:pt x="0" y="0"/>
+                </a:moveTo>
+                <a:lnTo>
+                  <a:pt x="120000" y="0"/>
+                </a:lnTo>
+                <a:lnTo>
+                  <a:pt x="120000" y="120000"/>
+                </a:lnTo>
+                <a:lnTo>
+                  <a:pt x="0" y="120000"/>
+                </a:lnTo>
+                <a:close/>
+              </a:path>
+            </a:pathLst>
+          </a:custGeom>
+        </p:spPr>
+      </p:sp>
+      <p:sp>
+        <p:nvSpPr>
+          <p:cNvPr id="232" name="Google Shape;232;gdc3cedfbf4_0_338:notes"/>
           <p:cNvSpPr txBox="1"/>
           <p:nvPr>
             <p:ph idx="1" type="body"/>
@@ -9043,6 +9643,118 @@
           </a:p>
         </p:txBody>
       </p:sp>
+      <p:pic>
+        <p:nvPicPr>
+          <p:cNvPr id="144" name="Google Shape;144;p22"/>
+          <p:cNvPicPr preferRelativeResize="0"/>
+          <p:nvPr/>
+        </p:nvPicPr>
+        <p:blipFill>
+          <a:blip r:embed="rId3">
+            <a:alphaModFix/>
+          </a:blip>
+          <a:stretch>
+            <a:fillRect/>
+          </a:stretch>
+        </p:blipFill>
+        <p:spPr>
+          <a:xfrm>
+            <a:off x="6359300" y="745650"/>
+            <a:ext cx="2370300" cy="2120300"/>
+          </a:xfrm>
+          <a:prstGeom prst="rect">
+            <a:avLst/>
+          </a:prstGeom>
+          <a:noFill/>
+          <a:ln cap="flat" cmpd="sng" w="9525">
+            <a:solidFill>
+              <a:schemeClr val="accent2"/>
+            </a:solidFill>
+            <a:prstDash val="solid"/>
+            <a:round/>
+            <a:headEnd len="sm" w="sm" type="none"/>
+            <a:tailEnd len="sm" w="sm" type="none"/>
+          </a:ln>
+        </p:spPr>
+      </p:pic>
+      <p:cxnSp>
+        <p:nvCxnSpPr>
+          <p:cNvPr id="145" name="Google Shape;145;p22"/>
+          <p:cNvCxnSpPr/>
+          <p:nvPr/>
+        </p:nvCxnSpPr>
+        <p:spPr>
+          <a:xfrm>
+            <a:off x="5361625" y="1075375"/>
+            <a:ext cx="862200" cy="30300"/>
+          </a:xfrm>
+          <a:prstGeom prst="straightConnector1">
+            <a:avLst/>
+          </a:prstGeom>
+          <a:noFill/>
+          <a:ln cap="flat" cmpd="sng" w="9525">
+            <a:solidFill>
+              <a:schemeClr val="dk2"/>
+            </a:solidFill>
+            <a:prstDash val="solid"/>
+            <a:round/>
+            <a:headEnd len="med" w="med" type="none"/>
+            <a:tailEnd len="med" w="med" type="triangle"/>
+          </a:ln>
+        </p:spPr>
+      </p:cxnSp>
+      <p:sp>
+        <p:nvSpPr>
+          <p:cNvPr id="146" name="Google Shape;146;p22"/>
+          <p:cNvSpPr txBox="1"/>
+          <p:nvPr/>
+        </p:nvSpPr>
+        <p:spPr>
+          <a:xfrm>
+            <a:off x="5021750" y="654350"/>
+            <a:ext cx="644100" cy="1200600"/>
+          </a:xfrm>
+          <a:prstGeom prst="rect">
+            <a:avLst/>
+          </a:prstGeom>
+          <a:noFill/>
+          <a:ln>
+            <a:noFill/>
+          </a:ln>
+        </p:spPr>
+        <p:txBody>
+          <a:bodyPr anchorCtr="0" anchor="t" bIns="91425" lIns="91425" spcFirstLastPara="1" rIns="91425" wrap="square" tIns="91425">
+            <a:spAutoFit/>
+          </a:bodyPr>
+          <a:lstStyle/>
+          <a:p>
+            <a:pPr indent="0" lvl="0" marL="0" rtl="0" algn="l">
+              <a:spcBef>
+                <a:spcPts val="0"/>
+              </a:spcBef>
+              <a:spcAft>
+                <a:spcPts val="0"/>
+              </a:spcAft>
+              <a:buNone/>
+            </a:pPr>
+            <a:r>
+              <a:rPr lang="en" sz="1100">
+                <a:latin typeface="Lato"/>
+                <a:ea typeface="Lato"/>
+                <a:cs typeface="Lato"/>
+                <a:sym typeface="Lato"/>
+              </a:rPr>
+              <a:t>The plus button to create a scene</a:t>
+            </a:r>
+            <a:endParaRPr sz="1100">
+              <a:latin typeface="Lato"/>
+              <a:ea typeface="Lato"/>
+              <a:cs typeface="Lato"/>
+              <a:sym typeface="Lato"/>
+            </a:endParaRPr>
+          </a:p>
+        </p:txBody>
+      </p:sp>
     </p:spTree>
   </p:cSld>
   <p:clrMapOvr>
@@ -9056,7 +9768,250 @@
   <p:cSld>
     <p:spTree>
       <p:nvGrpSpPr>
-        <p:cNvPr id="147" name="Shape 147"/>
+        <p:cNvPr id="150" name="Shape 150"/>
+        <p:cNvGrpSpPr/>
+        <p:nvPr/>
+      </p:nvGrpSpPr>
+      <p:grpSpPr>
+        <a:xfrm>
+          <a:off x="0" y="0"/>
+          <a:ext cx="0" cy="0"/>
+          <a:chOff x="0" y="0"/>
+          <a:chExt cx="0" cy="0"/>
+        </a:xfrm>
+      </p:grpSpPr>
+      <p:pic>
+        <p:nvPicPr>
+          <p:cNvPr id="151" name="Google Shape;151;p23"/>
+          <p:cNvPicPr preferRelativeResize="0"/>
+          <p:nvPr/>
+        </p:nvPicPr>
+        <p:blipFill rotWithShape="1">
+          <a:blip r:embed="rId3">
+            <a:alphaModFix/>
+          </a:blip>
+          <a:srcRect b="-5349" l="-4259" r="4260" t="5350"/>
+          <a:stretch/>
+        </p:blipFill>
+        <p:spPr>
+          <a:xfrm>
+            <a:off x="355325" y="629250"/>
+            <a:ext cx="2858865" cy="2419350"/>
+          </a:xfrm>
+          <a:prstGeom prst="rect">
+            <a:avLst/>
+          </a:prstGeom>
+          <a:noFill/>
+          <a:ln>
+            <a:noFill/>
+          </a:ln>
+        </p:spPr>
+      </p:pic>
+      <p:sp>
+        <p:nvSpPr>
+          <p:cNvPr id="152" name="Google Shape;152;p23"/>
+          <p:cNvSpPr txBox="1"/>
+          <p:nvPr/>
+        </p:nvSpPr>
+        <p:spPr>
+          <a:xfrm>
+            <a:off x="476825" y="3560875"/>
+            <a:ext cx="2663100" cy="1046700"/>
+          </a:xfrm>
+          <a:prstGeom prst="rect">
+            <a:avLst/>
+          </a:prstGeom>
+          <a:noFill/>
+          <a:ln>
+            <a:noFill/>
+          </a:ln>
+        </p:spPr>
+        <p:txBody>
+          <a:bodyPr anchorCtr="0" anchor="t" bIns="91425" lIns="91425" spcFirstLastPara="1" rIns="91425" wrap="square" tIns="91425">
+            <a:spAutoFit/>
+          </a:bodyPr>
+          <a:lstStyle/>
+          <a:p>
+            <a:pPr indent="0" lvl="0" marL="0" rtl="0" algn="l">
+              <a:spcBef>
+                <a:spcPts val="0"/>
+              </a:spcBef>
+              <a:spcAft>
+                <a:spcPts val="0"/>
+              </a:spcAft>
+              <a:buNone/>
+            </a:pPr>
+            <a:r>
+              <a:rPr lang="en">
+                <a:latin typeface="Lato"/>
+                <a:ea typeface="Lato"/>
+                <a:cs typeface="Lato"/>
+                <a:sym typeface="Lato"/>
+              </a:rPr>
+              <a:t>Node Search:</a:t>
+            </a:r>
+            <a:br>
+              <a:rPr lang="en">
+                <a:latin typeface="Lato"/>
+                <a:ea typeface="Lato"/>
+                <a:cs typeface="Lato"/>
+                <a:sym typeface="Lato"/>
+              </a:rPr>
+            </a:br>
+            <a:br>
+              <a:rPr lang="en">
+                <a:latin typeface="Lato"/>
+                <a:ea typeface="Lato"/>
+                <a:cs typeface="Lato"/>
+                <a:sym typeface="Lato"/>
+              </a:rPr>
+            </a:br>
+            <a:r>
+              <a:rPr lang="en">
+                <a:latin typeface="Lato"/>
+                <a:ea typeface="Lato"/>
+                <a:cs typeface="Lato"/>
+                <a:sym typeface="Lato"/>
+              </a:rPr>
+              <a:t>In the search bar, type KinematicBody2D</a:t>
+            </a:r>
+            <a:endParaRPr>
+              <a:latin typeface="Lato"/>
+              <a:ea typeface="Lato"/>
+              <a:cs typeface="Lato"/>
+              <a:sym typeface="Lato"/>
+            </a:endParaRPr>
+          </a:p>
+        </p:txBody>
+      </p:sp>
+      <p:pic>
+        <p:nvPicPr>
+          <p:cNvPr id="153" name="Google Shape;153;p23"/>
+          <p:cNvPicPr preferRelativeResize="0"/>
+          <p:nvPr/>
+        </p:nvPicPr>
+        <p:blipFill>
+          <a:blip r:embed="rId4">
+            <a:alphaModFix/>
+          </a:blip>
+          <a:stretch>
+            <a:fillRect/>
+          </a:stretch>
+        </p:blipFill>
+        <p:spPr>
+          <a:xfrm>
+            <a:off x="5593415" y="668475"/>
+            <a:ext cx="2812504" cy="2380116"/>
+          </a:xfrm>
+          <a:prstGeom prst="rect">
+            <a:avLst/>
+          </a:prstGeom>
+          <a:noFill/>
+          <a:ln>
+            <a:noFill/>
+          </a:ln>
+        </p:spPr>
+      </p:pic>
+      <p:sp>
+        <p:nvSpPr>
+          <p:cNvPr id="154" name="Google Shape;154;p23"/>
+          <p:cNvSpPr txBox="1"/>
+          <p:nvPr/>
+        </p:nvSpPr>
+        <p:spPr>
+          <a:xfrm>
+            <a:off x="5894225" y="3337700"/>
+            <a:ext cx="2445000" cy="1046700"/>
+          </a:xfrm>
+          <a:prstGeom prst="rect">
+            <a:avLst/>
+          </a:prstGeom>
+          <a:noFill/>
+          <a:ln>
+            <a:noFill/>
+          </a:ln>
+        </p:spPr>
+        <p:txBody>
+          <a:bodyPr anchorCtr="0" anchor="t" bIns="91425" lIns="91425" spcFirstLastPara="1" rIns="91425" wrap="square" tIns="91425">
+            <a:spAutoFit/>
+          </a:bodyPr>
+          <a:lstStyle/>
+          <a:p>
+            <a:pPr indent="0" lvl="0" marL="0" rtl="0" algn="l">
+              <a:spcBef>
+                <a:spcPts val="0"/>
+              </a:spcBef>
+              <a:spcAft>
+                <a:spcPts val="0"/>
+              </a:spcAft>
+              <a:buNone/>
+            </a:pPr>
+            <a:r>
+              <a:rPr lang="en">
+                <a:latin typeface="Lato"/>
+                <a:ea typeface="Lato"/>
+                <a:cs typeface="Lato"/>
+                <a:sym typeface="Lato"/>
+              </a:rPr>
+              <a:t>You’ll see this.</a:t>
+            </a:r>
+            <a:endParaRPr>
+              <a:latin typeface="Lato"/>
+              <a:ea typeface="Lato"/>
+              <a:cs typeface="Lato"/>
+              <a:sym typeface="Lato"/>
+            </a:endParaRPr>
+          </a:p>
+          <a:p>
+            <a:pPr indent="0" lvl="0" marL="0" rtl="0" algn="l">
+              <a:spcBef>
+                <a:spcPts val="0"/>
+              </a:spcBef>
+              <a:spcAft>
+                <a:spcPts val="0"/>
+              </a:spcAft>
+              <a:buNone/>
+            </a:pPr>
+            <a:br>
+              <a:rPr lang="en">
+                <a:latin typeface="Lato"/>
+                <a:ea typeface="Lato"/>
+                <a:cs typeface="Lato"/>
+                <a:sym typeface="Lato"/>
+              </a:rPr>
+            </a:br>
+            <a:r>
+              <a:rPr lang="en">
+                <a:latin typeface="Lato"/>
+                <a:ea typeface="Lato"/>
+                <a:cs typeface="Lato"/>
+                <a:sym typeface="Lato"/>
+              </a:rPr>
+              <a:t>This will be the root player node.</a:t>
+            </a:r>
+            <a:endParaRPr>
+              <a:latin typeface="Lato"/>
+              <a:ea typeface="Lato"/>
+              <a:cs typeface="Lato"/>
+              <a:sym typeface="Lato"/>
+            </a:endParaRPr>
+          </a:p>
+        </p:txBody>
+      </p:sp>
+    </p:spTree>
+  </p:cSld>
+  <p:clrMapOvr>
+    <a:masterClrMapping/>
+  </p:clrMapOvr>
+</p:sld>
+</file>
+
+<file path=ppt/slides/slide12.xml><?xml version="1.0" encoding="utf-8"?>
+<p:sld xmlns:a="http://schemas.openxmlformats.org/drawingml/2006/main" xmlns:r="http://schemas.openxmlformats.org/officeDocument/2006/relationships" xmlns:mc="http://schemas.openxmlformats.org/markup-compatibility/2006" xmlns:mv="urn:schemas-microsoft-com:mac:vml" xmlns:p="http://schemas.openxmlformats.org/presentationml/2006/main" xmlns:c="http://schemas.openxmlformats.org/drawingml/2006/chart" xmlns:dgm="http://schemas.openxmlformats.org/drawingml/2006/diagram" xmlns:o="urn:schemas-microsoft-com:office:office" xmlns:v="urn:schemas-microsoft-com:vml" xmlns:pvml="urn:schemas-microsoft-com:office:powerpoint" xmlns:com="http://schemas.openxmlformats.org/drawingml/2006/compatibility" xmlns:p14="http://schemas.microsoft.com/office/powerpoint/2010/main" xmlns:p15="http://schemas.microsoft.com/office/powerpoint/2012/main" xmlns:ahyp="http://schemas.microsoft.com/office/drawing/2018/hyperlinkcolor">
+  <p:cSld>
+    <p:spTree>
+      <p:nvGrpSpPr>
+        <p:cNvPr id="158" name="Shape 158"/>
         <p:cNvGrpSpPr/>
         <p:nvPr/>
       </p:nvGrpSpPr>
@@ -9070,7 +10025,7 @@
       </p:grpSpPr>
       <p:sp>
         <p:nvSpPr>
-          <p:cNvPr id="148" name="Google Shape;148;p23"/>
+          <p:cNvPr id="159" name="Google Shape;159;p24"/>
           <p:cNvSpPr txBox="1"/>
           <p:nvPr>
             <p:ph type="title"/>
@@ -9110,7 +10065,7 @@
       </p:sp>
       <p:sp>
         <p:nvSpPr>
-          <p:cNvPr id="149" name="Google Shape;149;p23"/>
+          <p:cNvPr id="160" name="Google Shape;160;p24"/>
           <p:cNvSpPr txBox="1"/>
           <p:nvPr>
             <p:ph idx="1" type="body"/>
@@ -9227,7 +10182,7 @@
       </p:sp>
       <p:pic>
         <p:nvPicPr>
-          <p:cNvPr id="150" name="Google Shape;150;p23"/>
+          <p:cNvPr id="161" name="Google Shape;161;p24"/>
           <p:cNvPicPr preferRelativeResize="0"/>
           <p:nvPr/>
         </p:nvPicPr>
@@ -9252,238 +10207,6 @@
           </a:ln>
         </p:spPr>
       </p:pic>
-    </p:spTree>
-  </p:cSld>
-  <p:clrMapOvr>
-    <a:masterClrMapping/>
-  </p:clrMapOvr>
-</p:sld>
-</file>
-
-<file path=ppt/slides/slide12.xml><?xml version="1.0" encoding="utf-8"?>
-<p:sld xmlns:a="http://schemas.openxmlformats.org/drawingml/2006/main" xmlns:r="http://schemas.openxmlformats.org/officeDocument/2006/relationships" xmlns:mc="http://schemas.openxmlformats.org/markup-compatibility/2006" xmlns:mv="urn:schemas-microsoft-com:mac:vml" xmlns:p="http://schemas.openxmlformats.org/presentationml/2006/main" xmlns:c="http://schemas.openxmlformats.org/drawingml/2006/chart" xmlns:dgm="http://schemas.openxmlformats.org/drawingml/2006/diagram" xmlns:o="urn:schemas-microsoft-com:office:office" xmlns:v="urn:schemas-microsoft-com:vml" xmlns:pvml="urn:schemas-microsoft-com:office:powerpoint" xmlns:com="http://schemas.openxmlformats.org/drawingml/2006/compatibility" xmlns:p14="http://schemas.microsoft.com/office/powerpoint/2010/main" xmlns:p15="http://schemas.microsoft.com/office/powerpoint/2012/main" xmlns:ahyp="http://schemas.microsoft.com/office/drawing/2018/hyperlinkcolor">
-  <p:cSld>
-    <p:spTree>
-      <p:nvGrpSpPr>
-        <p:cNvPr id="154" name="Shape 154"/>
-        <p:cNvGrpSpPr/>
-        <p:nvPr/>
-      </p:nvGrpSpPr>
-      <p:grpSpPr>
-        <a:xfrm>
-          <a:off x="0" y="0"/>
-          <a:ext cx="0" cy="0"/>
-          <a:chOff x="0" y="0"/>
-          <a:chExt cx="0" cy="0"/>
-        </a:xfrm>
-      </p:grpSpPr>
-      <p:sp>
-        <p:nvSpPr>
-          <p:cNvPr id="155" name="Google Shape;155;p24"/>
-          <p:cNvSpPr txBox="1"/>
-          <p:nvPr>
-            <p:ph type="title"/>
-          </p:nvPr>
-        </p:nvSpPr>
-        <p:spPr>
-          <a:xfrm>
-            <a:off x="729450" y="1318650"/>
-            <a:ext cx="7688700" cy="535200"/>
-          </a:xfrm>
-          <a:prstGeom prst="rect">
-            <a:avLst/>
-          </a:prstGeom>
-        </p:spPr>
-        <p:txBody>
-          <a:bodyPr anchorCtr="0" anchor="t" bIns="91425" lIns="91425" spcFirstLastPara="1" rIns="91425" wrap="square" tIns="91425">
-            <a:normAutofit fontScale="90000"/>
-          </a:bodyPr>
-          <a:lstStyle/>
-          <a:p>
-            <a:pPr indent="0" lvl="0" marL="0" rtl="0" algn="l">
-              <a:spcBef>
-                <a:spcPts val="0"/>
-              </a:spcBef>
-              <a:spcAft>
-                <a:spcPts val="0"/>
-              </a:spcAft>
-              <a:buNone/>
-            </a:pPr>
-            <a:r>
-              <a:rPr lang="en"/>
-              <a:t>Adding the Sprite!</a:t>
-            </a:r>
-            <a:endParaRPr/>
-          </a:p>
-        </p:txBody>
-      </p:sp>
-      <p:sp>
-        <p:nvSpPr>
-          <p:cNvPr id="156" name="Google Shape;156;p24"/>
-          <p:cNvSpPr txBox="1"/>
-          <p:nvPr>
-            <p:ph idx="1" type="body"/>
-          </p:nvPr>
-        </p:nvSpPr>
-        <p:spPr>
-          <a:xfrm>
-            <a:off x="729450" y="2078875"/>
-            <a:ext cx="7688700" cy="2261100"/>
-          </a:xfrm>
-          <a:prstGeom prst="rect">
-            <a:avLst/>
-          </a:prstGeom>
-        </p:spPr>
-        <p:txBody>
-          <a:bodyPr anchorCtr="0" anchor="t" bIns="91425" lIns="91425" spcFirstLastPara="1" rIns="91425" wrap="square" tIns="91425">
-            <a:normAutofit lnSpcReduction="20000"/>
-          </a:bodyPr>
-          <a:lstStyle/>
-          <a:p>
-            <a:pPr indent="0" lvl="0" marL="0" rtl="0" algn="l">
-              <a:spcBef>
-                <a:spcPts val="0"/>
-              </a:spcBef>
-              <a:spcAft>
-                <a:spcPts val="0"/>
-              </a:spcAft>
-              <a:buNone/>
-            </a:pPr>
-            <a:r>
-              <a:rPr lang="en"/>
-              <a:t>We could drag and drop the sprite into the scene, but we just learned how to add nodes to a scene in Godot. </a:t>
-            </a:r>
-            <a:endParaRPr/>
-          </a:p>
-          <a:p>
-            <a:pPr indent="-311150" lvl="0" marL="457200" rtl="0" algn="l">
-              <a:spcBef>
-                <a:spcPts val="1200"/>
-              </a:spcBef>
-              <a:spcAft>
-                <a:spcPts val="0"/>
-              </a:spcAft>
-              <a:buSzPts val="1300"/>
-              <a:buChar char="●"/>
-            </a:pPr>
-            <a:r>
-              <a:rPr lang="en"/>
-              <a:t>We’ll add a new sprite node to the scene.</a:t>
-            </a:r>
-            <a:endParaRPr/>
-          </a:p>
-          <a:p>
-            <a:pPr indent="-311150" lvl="0" marL="457200" rtl="0" algn="l">
-              <a:spcBef>
-                <a:spcPts val="0"/>
-              </a:spcBef>
-              <a:spcAft>
-                <a:spcPts val="0"/>
-              </a:spcAft>
-              <a:buSzPts val="1300"/>
-              <a:buChar char="●"/>
-            </a:pPr>
-            <a:r>
-              <a:rPr lang="en"/>
-              <a:t>Adding sprites this way centers the sprite on our scene</a:t>
-            </a:r>
-            <a:endParaRPr/>
-          </a:p>
-          <a:p>
-            <a:pPr indent="-311150" lvl="0" marL="457200" rtl="0" algn="l">
-              <a:spcBef>
-                <a:spcPts val="0"/>
-              </a:spcBef>
-              <a:spcAft>
-                <a:spcPts val="0"/>
-              </a:spcAft>
-              <a:buSzPts val="1300"/>
-              <a:buChar char="●"/>
-            </a:pPr>
-            <a:r>
-              <a:rPr lang="en"/>
-              <a:t>Then we select the Texture in the Assets folder for the player.</a:t>
-            </a:r>
-            <a:endParaRPr/>
-          </a:p>
-          <a:p>
-            <a:pPr indent="-311150" lvl="0" marL="457200" rtl="0" algn="l">
-              <a:spcBef>
-                <a:spcPts val="0"/>
-              </a:spcBef>
-              <a:spcAft>
-                <a:spcPts val="0"/>
-              </a:spcAft>
-              <a:buSzPts val="1300"/>
-              <a:buChar char="●"/>
-            </a:pPr>
-            <a:r>
-              <a:rPr lang="en"/>
-              <a:t>But it’s huge! That’s because the player asset is a </a:t>
-            </a:r>
-            <a:r>
-              <a:rPr i="1" lang="en"/>
-              <a:t>sprite sheet</a:t>
-            </a:r>
-            <a:r>
-              <a:rPr lang="en"/>
-              <a:t>. Which is used for animation as well, which we will get to!</a:t>
-            </a:r>
-            <a:endParaRPr/>
-          </a:p>
-          <a:p>
-            <a:pPr indent="-311150" lvl="0" marL="457200" rtl="0" algn="l">
-              <a:spcBef>
-                <a:spcPts val="0"/>
-              </a:spcBef>
-              <a:spcAft>
-                <a:spcPts val="0"/>
-              </a:spcAft>
-              <a:buSzPts val="1300"/>
-              <a:buChar char="●"/>
-            </a:pPr>
-            <a:r>
-              <a:rPr lang="en"/>
-              <a:t>We need to tell Godot to use only one frame of the sheet at a time.</a:t>
-            </a:r>
-            <a:endParaRPr/>
-          </a:p>
-          <a:p>
-            <a:pPr indent="-311150" lvl="0" marL="457200" rtl="0" algn="l">
-              <a:spcBef>
-                <a:spcPts val="0"/>
-              </a:spcBef>
-              <a:spcAft>
-                <a:spcPts val="0"/>
-              </a:spcAft>
-              <a:buSzPts val="1300"/>
-              <a:buChar char="●"/>
-            </a:pPr>
-            <a:r>
-              <a:rPr lang="en"/>
-              <a:t>On this sprite sheet, there are 60 Horizontal frames and 1 Vertical frame.</a:t>
-            </a:r>
-            <a:endParaRPr/>
-          </a:p>
-          <a:p>
-            <a:pPr indent="-311150" lvl="0" marL="457200" rtl="0" algn="l">
-              <a:spcBef>
-                <a:spcPts val="0"/>
-              </a:spcBef>
-              <a:spcAft>
-                <a:spcPts val="0"/>
-              </a:spcAft>
-              <a:buSzPts val="1300"/>
-              <a:buChar char="●"/>
-            </a:pPr>
-            <a:r>
-              <a:rPr lang="en"/>
-              <a:t>In the animation tab on the sprite node, we can set the HFrames value to 60.</a:t>
-            </a:r>
-            <a:endParaRPr/>
-          </a:p>
-        </p:txBody>
-      </p:sp>
     </p:spTree>
   </p:cSld>
   <p:clrMapOvr>
@@ -9497,7 +10220,7 @@
   <p:cSld>
     <p:spTree>
       <p:nvGrpSpPr>
-        <p:cNvPr id="160" name="Shape 160"/>
+        <p:cNvPr id="165" name="Shape 165"/>
         <p:cNvGrpSpPr/>
         <p:nvPr/>
       </p:nvGrpSpPr>
@@ -9509,149 +10232,9 @@
           <a:chExt cx="0" cy="0"/>
         </a:xfrm>
       </p:grpSpPr>
-      <p:sp>
-        <p:nvSpPr>
-          <p:cNvPr id="161" name="Google Shape;161;p25"/>
-          <p:cNvSpPr txBox="1"/>
-          <p:nvPr>
-            <p:ph type="title"/>
-          </p:nvPr>
-        </p:nvSpPr>
-        <p:spPr>
-          <a:xfrm>
-            <a:off x="729450" y="1318650"/>
-            <a:ext cx="7688700" cy="535200"/>
-          </a:xfrm>
-          <a:prstGeom prst="rect">
-            <a:avLst/>
-          </a:prstGeom>
-        </p:spPr>
-        <p:txBody>
-          <a:bodyPr anchorCtr="0" anchor="t" bIns="91425" lIns="91425" spcFirstLastPara="1" rIns="91425" wrap="square" tIns="91425">
-            <a:normAutofit fontScale="90000"/>
-          </a:bodyPr>
-          <a:lstStyle/>
-          <a:p>
-            <a:pPr indent="0" lvl="0" marL="0" rtl="0" algn="l">
-              <a:spcBef>
-                <a:spcPts val="0"/>
-              </a:spcBef>
-              <a:spcAft>
-                <a:spcPts val="0"/>
-              </a:spcAft>
-              <a:buNone/>
-            </a:pPr>
-            <a:r>
-              <a:rPr lang="en"/>
-              <a:t>First Lines of CODE: Scripting the Movement!</a:t>
-            </a:r>
-            <a:endParaRPr/>
-          </a:p>
-        </p:txBody>
-      </p:sp>
-      <p:sp>
-        <p:nvSpPr>
-          <p:cNvPr id="162" name="Google Shape;162;p25"/>
-          <p:cNvSpPr txBox="1"/>
-          <p:nvPr>
-            <p:ph idx="1" type="body"/>
-          </p:nvPr>
-        </p:nvSpPr>
-        <p:spPr>
-          <a:xfrm>
-            <a:off x="729450" y="2078875"/>
-            <a:ext cx="7688700" cy="2261100"/>
-          </a:xfrm>
-          <a:prstGeom prst="rect">
-            <a:avLst/>
-          </a:prstGeom>
-        </p:spPr>
-        <p:txBody>
-          <a:bodyPr anchorCtr="0" anchor="t" bIns="91425" lIns="91425" spcFirstLastPara="1" rIns="91425" wrap="square" tIns="91425">
-            <a:normAutofit/>
-          </a:bodyPr>
-          <a:lstStyle/>
-          <a:p>
-            <a:pPr indent="-311150" lvl="0" marL="457200" rtl="0" algn="l">
-              <a:spcBef>
-                <a:spcPts val="0"/>
-              </a:spcBef>
-              <a:spcAft>
-                <a:spcPts val="0"/>
-              </a:spcAft>
-              <a:buSzPts val="1300"/>
-              <a:buChar char="●"/>
-            </a:pPr>
-            <a:r>
-              <a:rPr lang="en"/>
-              <a:t>Godot uses a programming language called Godot Scripting </a:t>
-            </a:r>
-            <a:r>
-              <a:rPr lang="en"/>
-              <a:t>Language</a:t>
-            </a:r>
-            <a:r>
-              <a:rPr lang="en"/>
-              <a:t>, which is heavily inspired by Python.</a:t>
-            </a:r>
-            <a:endParaRPr/>
-          </a:p>
-          <a:p>
-            <a:pPr indent="-311150" lvl="0" marL="457200" rtl="0" algn="l">
-              <a:spcBef>
-                <a:spcPts val="0"/>
-              </a:spcBef>
-              <a:spcAft>
-                <a:spcPts val="0"/>
-              </a:spcAft>
-              <a:buSzPts val="1300"/>
-              <a:buChar char="●"/>
-            </a:pPr>
-            <a:r>
-              <a:rPr lang="en"/>
-              <a:t>We can create a new script in a scene with the script icon with a plus</a:t>
-            </a:r>
-            <a:endParaRPr/>
-          </a:p>
-          <a:p>
-            <a:pPr indent="-311150" lvl="0" marL="457200" rtl="0" algn="l">
-              <a:spcBef>
-                <a:spcPts val="0"/>
-              </a:spcBef>
-              <a:spcAft>
-                <a:spcPts val="0"/>
-              </a:spcAft>
-              <a:buSzPts val="1300"/>
-              <a:buChar char="●"/>
-            </a:pPr>
-            <a:r>
-              <a:rPr lang="en"/>
-              <a:t>Godot will then ask us what kind of script we want to make, and for this project all the scripts will be GDScript.</a:t>
-            </a:r>
-            <a:endParaRPr/>
-          </a:p>
-          <a:p>
-            <a:pPr indent="-311150" lvl="0" marL="457200" rtl="0" algn="l">
-              <a:spcBef>
-                <a:spcPts val="0"/>
-              </a:spcBef>
-              <a:spcAft>
-                <a:spcPts val="0"/>
-              </a:spcAft>
-              <a:buSzPts val="1300"/>
-              <a:buChar char="●"/>
-            </a:pPr>
-            <a:r>
-              <a:rPr lang="en"/>
-              <a:t>Let’s add the Player.gd script into Source/Actors/Player/ folder.</a:t>
-            </a:r>
-            <a:endParaRPr/>
-          </a:p>
-        </p:txBody>
-      </p:sp>
       <p:pic>
         <p:nvPicPr>
-          <p:cNvPr id="163" name="Google Shape;163;p25"/>
+          <p:cNvPr id="166" name="Google Shape;166;p25"/>
           <p:cNvPicPr preferRelativeResize="0"/>
           <p:nvPr/>
         </p:nvPicPr>
@@ -9665,8 +10248,8 @@
         </p:blipFill>
         <p:spPr>
           <a:xfrm>
-            <a:off x="1093000" y="3529325"/>
-            <a:ext cx="3971925" cy="714375"/>
+            <a:off x="2039350" y="882601"/>
+            <a:ext cx="1741575" cy="3662099"/>
           </a:xfrm>
           <a:prstGeom prst="rect">
             <a:avLst/>
@@ -9677,6 +10260,251 @@
           </a:ln>
         </p:spPr>
       </p:pic>
+      <p:cxnSp>
+        <p:nvCxnSpPr>
+          <p:cNvPr id="167" name="Google Shape;167;p25"/>
+          <p:cNvCxnSpPr/>
+          <p:nvPr/>
+        </p:nvCxnSpPr>
+        <p:spPr>
+          <a:xfrm>
+            <a:off x="755800" y="1425375"/>
+            <a:ext cx="1060200" cy="55800"/>
+          </a:xfrm>
+          <a:prstGeom prst="straightConnector1">
+            <a:avLst/>
+          </a:prstGeom>
+          <a:noFill/>
+          <a:ln cap="flat" cmpd="sng" w="9525">
+            <a:solidFill>
+              <a:schemeClr val="dk2"/>
+            </a:solidFill>
+            <a:prstDash val="solid"/>
+            <a:round/>
+            <a:headEnd len="med" w="med" type="none"/>
+            <a:tailEnd len="med" w="med" type="triangle"/>
+          </a:ln>
+        </p:spPr>
+      </p:cxnSp>
+      <p:sp>
+        <p:nvSpPr>
+          <p:cNvPr id="168" name="Google Shape;168;p25"/>
+          <p:cNvSpPr txBox="1"/>
+          <p:nvPr/>
+        </p:nvSpPr>
+        <p:spPr>
+          <a:xfrm>
+            <a:off x="456525" y="1582600"/>
+            <a:ext cx="2921700" cy="1046700"/>
+          </a:xfrm>
+          <a:prstGeom prst="rect">
+            <a:avLst/>
+          </a:prstGeom>
+          <a:noFill/>
+          <a:ln>
+            <a:noFill/>
+          </a:ln>
+        </p:spPr>
+        <p:txBody>
+          <a:bodyPr anchorCtr="0" anchor="t" bIns="91425" lIns="91425" spcFirstLastPara="1" rIns="91425" wrap="square" tIns="91425">
+            <a:spAutoFit/>
+          </a:bodyPr>
+          <a:lstStyle/>
+          <a:p>
+            <a:pPr indent="0" lvl="0" marL="0" rtl="0" algn="l">
+              <a:spcBef>
+                <a:spcPts val="0"/>
+              </a:spcBef>
+              <a:spcAft>
+                <a:spcPts val="0"/>
+              </a:spcAft>
+              <a:buNone/>
+            </a:pPr>
+            <a:r>
+              <a:rPr lang="en">
+                <a:latin typeface="Lato"/>
+                <a:ea typeface="Lato"/>
+                <a:cs typeface="Lato"/>
+                <a:sym typeface="Lato"/>
+              </a:rPr>
+              <a:t>We’re gonna </a:t>
+            </a:r>
+            <a:endParaRPr>
+              <a:latin typeface="Lato"/>
+              <a:ea typeface="Lato"/>
+              <a:cs typeface="Lato"/>
+              <a:sym typeface="Lato"/>
+            </a:endParaRPr>
+          </a:p>
+          <a:p>
+            <a:pPr indent="0" lvl="0" marL="0" rtl="0" algn="l">
+              <a:spcBef>
+                <a:spcPts val="0"/>
+              </a:spcBef>
+              <a:spcAft>
+                <a:spcPts val="0"/>
+              </a:spcAft>
+              <a:buNone/>
+            </a:pPr>
+            <a:r>
+              <a:rPr lang="en">
+                <a:latin typeface="Lato"/>
+                <a:ea typeface="Lato"/>
+                <a:cs typeface="Lato"/>
+                <a:sym typeface="Lato"/>
+              </a:rPr>
+              <a:t>rename</a:t>
+            </a:r>
+            <a:endParaRPr>
+              <a:latin typeface="Lato"/>
+              <a:ea typeface="Lato"/>
+              <a:cs typeface="Lato"/>
+              <a:sym typeface="Lato"/>
+            </a:endParaRPr>
+          </a:p>
+          <a:p>
+            <a:pPr indent="0" lvl="0" marL="0" rtl="0" algn="l">
+              <a:spcBef>
+                <a:spcPts val="0"/>
+              </a:spcBef>
+              <a:spcAft>
+                <a:spcPts val="0"/>
+              </a:spcAft>
+              <a:buNone/>
+            </a:pPr>
+            <a:r>
+              <a:rPr lang="en">
+                <a:latin typeface="Lato"/>
+                <a:ea typeface="Lato"/>
+                <a:cs typeface="Lato"/>
+                <a:sym typeface="Lato"/>
+              </a:rPr>
+              <a:t>This to :</a:t>
+            </a:r>
+            <a:br>
+              <a:rPr lang="en">
+                <a:latin typeface="Lato"/>
+                <a:ea typeface="Lato"/>
+                <a:cs typeface="Lato"/>
+                <a:sym typeface="Lato"/>
+              </a:rPr>
+            </a:br>
+            <a:r>
+              <a:rPr lang="en">
+                <a:latin typeface="Lato"/>
+                <a:ea typeface="Lato"/>
+                <a:cs typeface="Lato"/>
+                <a:sym typeface="Lato"/>
+              </a:rPr>
+              <a:t>Player</a:t>
+            </a:r>
+            <a:endParaRPr>
+              <a:latin typeface="Lato"/>
+              <a:ea typeface="Lato"/>
+              <a:cs typeface="Lato"/>
+              <a:sym typeface="Lato"/>
+            </a:endParaRPr>
+          </a:p>
+        </p:txBody>
+      </p:sp>
+      <p:cxnSp>
+        <p:nvCxnSpPr>
+          <p:cNvPr id="169" name="Google Shape;169;p25"/>
+          <p:cNvCxnSpPr/>
+          <p:nvPr/>
+        </p:nvCxnSpPr>
+        <p:spPr>
+          <a:xfrm rot="10800000">
+            <a:off x="2196525" y="1344275"/>
+            <a:ext cx="4068000" cy="486900"/>
+          </a:xfrm>
+          <a:prstGeom prst="straightConnector1">
+            <a:avLst/>
+          </a:prstGeom>
+          <a:noFill/>
+          <a:ln cap="flat" cmpd="sng" w="9525">
+            <a:solidFill>
+              <a:schemeClr val="dk2"/>
+            </a:solidFill>
+            <a:prstDash val="solid"/>
+            <a:round/>
+            <a:headEnd len="med" w="med" type="none"/>
+            <a:tailEnd len="med" w="med" type="triangle"/>
+          </a:ln>
+        </p:spPr>
+      </p:cxnSp>
+      <p:sp>
+        <p:nvSpPr>
+          <p:cNvPr id="170" name="Google Shape;170;p25"/>
+          <p:cNvSpPr txBox="1"/>
+          <p:nvPr/>
+        </p:nvSpPr>
+        <p:spPr>
+          <a:xfrm>
+            <a:off x="4088425" y="1831175"/>
+            <a:ext cx="1953000" cy="1046700"/>
+          </a:xfrm>
+          <a:prstGeom prst="rect">
+            <a:avLst/>
+          </a:prstGeom>
+          <a:noFill/>
+          <a:ln>
+            <a:noFill/>
+          </a:ln>
+        </p:spPr>
+        <p:txBody>
+          <a:bodyPr anchorCtr="0" anchor="t" bIns="91425" lIns="91425" spcFirstLastPara="1" rIns="91425" wrap="square" tIns="91425">
+            <a:spAutoFit/>
+          </a:bodyPr>
+          <a:lstStyle/>
+          <a:p>
+            <a:pPr indent="0" lvl="0" marL="0" rtl="0" algn="l">
+              <a:spcBef>
+                <a:spcPts val="0"/>
+              </a:spcBef>
+              <a:spcAft>
+                <a:spcPts val="0"/>
+              </a:spcAft>
+              <a:buNone/>
+            </a:pPr>
+            <a:r>
+              <a:rPr lang="en">
+                <a:latin typeface="Lato"/>
+                <a:ea typeface="Lato"/>
+                <a:cs typeface="Lato"/>
+                <a:sym typeface="Lato"/>
+              </a:rPr>
+              <a:t>We’re gonna search for CollisionShape2D next</a:t>
+            </a:r>
+            <a:endParaRPr>
+              <a:latin typeface="Lato"/>
+              <a:ea typeface="Lato"/>
+              <a:cs typeface="Lato"/>
+              <a:sym typeface="Lato"/>
+            </a:endParaRPr>
+          </a:p>
+          <a:p>
+            <a:pPr indent="0" lvl="0" marL="0" rtl="0" algn="l">
+              <a:spcBef>
+                <a:spcPts val="0"/>
+              </a:spcBef>
+              <a:spcAft>
+                <a:spcPts val="0"/>
+              </a:spcAft>
+              <a:buNone/>
+            </a:pPr>
+            <a:r>
+              <a:t/>
+            </a:r>
+            <a:endParaRPr>
+              <a:latin typeface="Lato"/>
+              <a:ea typeface="Lato"/>
+              <a:cs typeface="Lato"/>
+              <a:sym typeface="Lato"/>
+            </a:endParaRPr>
+          </a:p>
+        </p:txBody>
+      </p:sp>
     </p:spTree>
   </p:cSld>
   <p:clrMapOvr>
@@ -9690,7 +10518,7 @@
   <p:cSld>
     <p:spTree>
       <p:nvGrpSpPr>
-        <p:cNvPr id="167" name="Shape 167"/>
+        <p:cNvPr id="174" name="Shape 174"/>
         <p:cNvGrpSpPr/>
         <p:nvPr/>
       </p:nvGrpSpPr>
@@ -9702,26 +10530,56 @@
           <a:chExt cx="0" cy="0"/>
         </a:xfrm>
       </p:grpSpPr>
-      <p:sp>
-        <p:nvSpPr>
-          <p:cNvPr id="168" name="Google Shape;168;p26"/>
-          <p:cNvSpPr txBox="1"/>
-          <p:nvPr>
-            <p:ph type="title"/>
-          </p:nvPr>
-        </p:nvSpPr>
-        <p:spPr>
-          <a:xfrm>
-            <a:off x="729450" y="1318650"/>
-            <a:ext cx="7688700" cy="535200"/>
+      <p:pic>
+        <p:nvPicPr>
+          <p:cNvPr id="175" name="Google Shape;175;p26"/>
+          <p:cNvPicPr preferRelativeResize="0"/>
+          <p:nvPr/>
+        </p:nvPicPr>
+        <p:blipFill>
+          <a:blip r:embed="rId3">
+            <a:alphaModFix/>
+          </a:blip>
+          <a:stretch>
+            <a:fillRect/>
+          </a:stretch>
+        </p:blipFill>
+        <p:spPr>
+          <a:xfrm>
+            <a:off x="1760375" y="682225"/>
+            <a:ext cx="5209224" cy="3933499"/>
           </a:xfrm>
           <a:prstGeom prst="rect">
             <a:avLst/>
           </a:prstGeom>
+          <a:noFill/>
+          <a:ln>
+            <a:noFill/>
+          </a:ln>
+        </p:spPr>
+      </p:pic>
+      <p:sp>
+        <p:nvSpPr>
+          <p:cNvPr id="176" name="Google Shape;176;p26"/>
+          <p:cNvSpPr txBox="1"/>
+          <p:nvPr/>
+        </p:nvSpPr>
+        <p:spPr>
+          <a:xfrm>
+            <a:off x="486950" y="1618125"/>
+            <a:ext cx="1121100" cy="831300"/>
+          </a:xfrm>
+          <a:prstGeom prst="rect">
+            <a:avLst/>
+          </a:prstGeom>
+          <a:noFill/>
+          <a:ln>
+            <a:noFill/>
+          </a:ln>
         </p:spPr>
         <p:txBody>
           <a:bodyPr anchorCtr="0" anchor="t" bIns="91425" lIns="91425" spcFirstLastPara="1" rIns="91425" wrap="square" tIns="91425">
-            <a:normAutofit fontScale="90000"/>
+            <a:spAutoFit/>
           </a:bodyPr>
           <a:lstStyle/>
           <a:p>
@@ -9735,85 +10593,20 @@
               <a:buNone/>
             </a:pPr>
             <a:r>
-              <a:rPr lang="en"/>
-              <a:t>The Two Primary Functions in a Godot Script</a:t>
-            </a:r>
-            <a:endParaRPr/>
-          </a:p>
-        </p:txBody>
-      </p:sp>
-      <p:sp>
-        <p:nvSpPr>
-          <p:cNvPr id="169" name="Google Shape;169;p26"/>
-          <p:cNvSpPr txBox="1"/>
-          <p:nvPr>
-            <p:ph idx="1" type="body"/>
-          </p:nvPr>
-        </p:nvSpPr>
-        <p:spPr>
-          <a:xfrm>
-            <a:off x="729450" y="2078875"/>
-            <a:ext cx="7688700" cy="2261100"/>
-          </a:xfrm>
-          <a:prstGeom prst="rect">
-            <a:avLst/>
-          </a:prstGeom>
-        </p:spPr>
-        <p:txBody>
-          <a:bodyPr anchorCtr="0" anchor="t" bIns="91425" lIns="91425" spcFirstLastPara="1" rIns="91425" wrap="square" tIns="91425">
-            <a:normAutofit/>
-          </a:bodyPr>
-          <a:lstStyle/>
-          <a:p>
-            <a:pPr indent="-311150" lvl="0" marL="457200" rtl="0" algn="l">
-              <a:spcBef>
-                <a:spcPts val="0"/>
-              </a:spcBef>
-              <a:spcAft>
-                <a:spcPts val="0"/>
-              </a:spcAft>
-              <a:buSzPts val="1300"/>
-              <a:buChar char="●"/>
-            </a:pPr>
-            <a:r>
-              <a:rPr lang="en"/>
-              <a:t>_physics_process(delta)</a:t>
-            </a:r>
-            <a:endParaRPr/>
-          </a:p>
-          <a:p>
-            <a:pPr indent="-311150" lvl="0" marL="457200" rtl="0" algn="l">
-              <a:spcBef>
-                <a:spcPts val="0"/>
-              </a:spcBef>
-              <a:spcAft>
-                <a:spcPts val="0"/>
-              </a:spcAft>
-              <a:buSzPts val="1300"/>
-              <a:buChar char="●"/>
-            </a:pPr>
-            <a:r>
-              <a:rPr lang="en"/>
-              <a:t>_ready()</a:t>
-            </a:r>
-            <a:endParaRPr/>
-          </a:p>
-          <a:p>
-            <a:pPr indent="-311150" lvl="0" marL="457200" rtl="0" algn="l">
-              <a:spcBef>
-                <a:spcPts val="0"/>
-              </a:spcBef>
-              <a:spcAft>
-                <a:spcPts val="0"/>
-              </a:spcAft>
-              <a:buSzPts val="1300"/>
-              <a:buChar char="●"/>
-            </a:pPr>
-            <a:r>
-              <a:rPr lang="en"/>
-              <a:t>What do you think these two do?</a:t>
-            </a:r>
-            <a:endParaRPr/>
+              <a:rPr lang="en">
+                <a:latin typeface="Lato"/>
+                <a:ea typeface="Lato"/>
+                <a:cs typeface="Lato"/>
+                <a:sym typeface="Lato"/>
+              </a:rPr>
+              <a:t>Add collision shape 2D</a:t>
+            </a:r>
+            <a:endParaRPr>
+              <a:latin typeface="Lato"/>
+              <a:ea typeface="Lato"/>
+              <a:cs typeface="Lato"/>
+              <a:sym typeface="Lato"/>
+            </a:endParaRPr>
           </a:p>
         </p:txBody>
       </p:sp>
@@ -9830,7 +10623,183 @@
   <p:cSld>
     <p:spTree>
       <p:nvGrpSpPr>
-        <p:cNvPr id="173" name="Shape 173"/>
+        <p:cNvPr id="180" name="Shape 180"/>
+        <p:cNvGrpSpPr/>
+        <p:nvPr/>
+      </p:nvGrpSpPr>
+      <p:grpSpPr>
+        <a:xfrm>
+          <a:off x="0" y="0"/>
+          <a:ext cx="0" cy="0"/>
+          <a:chOff x="0" y="0"/>
+          <a:chExt cx="0" cy="0"/>
+        </a:xfrm>
+      </p:grpSpPr>
+      <p:pic>
+        <p:nvPicPr>
+          <p:cNvPr id="181" name="Google Shape;181;p27"/>
+          <p:cNvPicPr preferRelativeResize="0"/>
+          <p:nvPr/>
+        </p:nvPicPr>
+        <p:blipFill>
+          <a:blip r:embed="rId3">
+            <a:alphaModFix/>
+          </a:blip>
+          <a:stretch>
+            <a:fillRect/>
+          </a:stretch>
+        </p:blipFill>
+        <p:spPr>
+          <a:xfrm>
+            <a:off x="314725" y="1362075"/>
+            <a:ext cx="3204005" cy="2419350"/>
+          </a:xfrm>
+          <a:prstGeom prst="rect">
+            <a:avLst/>
+          </a:prstGeom>
+          <a:noFill/>
+          <a:ln>
+            <a:noFill/>
+          </a:ln>
+        </p:spPr>
+      </p:pic>
+      <p:cxnSp>
+        <p:nvCxnSpPr>
+          <p:cNvPr id="182" name="Google Shape;182;p27"/>
+          <p:cNvCxnSpPr/>
+          <p:nvPr/>
+        </p:nvCxnSpPr>
+        <p:spPr>
+          <a:xfrm flipH="1">
+            <a:off x="3652100" y="2105100"/>
+            <a:ext cx="350100" cy="10200"/>
+          </a:xfrm>
+          <a:prstGeom prst="straightConnector1">
+            <a:avLst/>
+          </a:prstGeom>
+          <a:noFill/>
+          <a:ln cap="flat" cmpd="sng" w="9525">
+            <a:solidFill>
+              <a:schemeClr val="dk2"/>
+            </a:solidFill>
+            <a:prstDash val="solid"/>
+            <a:round/>
+            <a:headEnd len="med" w="med" type="none"/>
+            <a:tailEnd len="med" w="med" type="triangle"/>
+          </a:ln>
+        </p:spPr>
+      </p:cxnSp>
+      <p:sp>
+        <p:nvSpPr>
+          <p:cNvPr id="183" name="Google Shape;183;p27"/>
+          <p:cNvSpPr txBox="1"/>
+          <p:nvPr/>
+        </p:nvSpPr>
+        <p:spPr>
+          <a:xfrm>
+            <a:off x="3885525" y="1567400"/>
+            <a:ext cx="842100" cy="831300"/>
+          </a:xfrm>
+          <a:prstGeom prst="rect">
+            <a:avLst/>
+          </a:prstGeom>
+          <a:noFill/>
+          <a:ln>
+            <a:noFill/>
+          </a:ln>
+        </p:spPr>
+        <p:txBody>
+          <a:bodyPr anchorCtr="0" anchor="t" bIns="91425" lIns="91425" spcFirstLastPara="1" rIns="91425" wrap="square" tIns="91425">
+            <a:spAutoFit/>
+          </a:bodyPr>
+          <a:lstStyle/>
+          <a:p>
+            <a:pPr indent="0" lvl="0" marL="0" rtl="0" algn="l">
+              <a:spcBef>
+                <a:spcPts val="0"/>
+              </a:spcBef>
+              <a:spcAft>
+                <a:spcPts val="0"/>
+              </a:spcAft>
+              <a:buNone/>
+            </a:pPr>
+            <a:r>
+              <a:rPr lang="en">
+                <a:latin typeface="Lato"/>
+                <a:ea typeface="Lato"/>
+                <a:cs typeface="Lato"/>
+                <a:sym typeface="Lato"/>
+              </a:rPr>
+              <a:t>Look for:</a:t>
+            </a:r>
+            <a:br>
+              <a:rPr lang="en">
+                <a:latin typeface="Lato"/>
+                <a:ea typeface="Lato"/>
+                <a:cs typeface="Lato"/>
+                <a:sym typeface="Lato"/>
+              </a:rPr>
+            </a:br>
+            <a:r>
+              <a:rPr lang="en">
+                <a:latin typeface="Lato"/>
+                <a:ea typeface="Lato"/>
+                <a:cs typeface="Lato"/>
+                <a:sym typeface="Lato"/>
+              </a:rPr>
+              <a:t>Capsule</a:t>
+            </a:r>
+            <a:endParaRPr>
+              <a:latin typeface="Lato"/>
+              <a:ea typeface="Lato"/>
+              <a:cs typeface="Lato"/>
+              <a:sym typeface="Lato"/>
+            </a:endParaRPr>
+          </a:p>
+        </p:txBody>
+      </p:sp>
+      <p:pic>
+        <p:nvPicPr>
+          <p:cNvPr id="184" name="Google Shape;184;p27"/>
+          <p:cNvPicPr preferRelativeResize="0"/>
+          <p:nvPr/>
+        </p:nvPicPr>
+        <p:blipFill>
+          <a:blip r:embed="rId4">
+            <a:alphaModFix/>
+          </a:blip>
+          <a:stretch>
+            <a:fillRect/>
+          </a:stretch>
+        </p:blipFill>
+        <p:spPr>
+          <a:xfrm>
+            <a:off x="4641625" y="994425"/>
+            <a:ext cx="4111575" cy="3104659"/>
+          </a:xfrm>
+          <a:prstGeom prst="rect">
+            <a:avLst/>
+          </a:prstGeom>
+          <a:noFill/>
+          <a:ln>
+            <a:noFill/>
+          </a:ln>
+        </p:spPr>
+      </p:pic>
+    </p:spTree>
+  </p:cSld>
+  <p:clrMapOvr>
+    <a:masterClrMapping/>
+  </p:clrMapOvr>
+</p:sld>
+</file>
+
+<file path=ppt/slides/slide16.xml><?xml version="1.0" encoding="utf-8"?>
+<p:sld xmlns:a="http://schemas.openxmlformats.org/drawingml/2006/main" xmlns:r="http://schemas.openxmlformats.org/officeDocument/2006/relationships" xmlns:mc="http://schemas.openxmlformats.org/markup-compatibility/2006" xmlns:mv="urn:schemas-microsoft-com:mac:vml" xmlns:p="http://schemas.openxmlformats.org/presentationml/2006/main" xmlns:c="http://schemas.openxmlformats.org/drawingml/2006/chart" xmlns:dgm="http://schemas.openxmlformats.org/drawingml/2006/diagram" xmlns:o="urn:schemas-microsoft-com:office:office" xmlns:v="urn:schemas-microsoft-com:vml" xmlns:pvml="urn:schemas-microsoft-com:office:powerpoint" xmlns:com="http://schemas.openxmlformats.org/drawingml/2006/compatibility" xmlns:p14="http://schemas.microsoft.com/office/powerpoint/2010/main" xmlns:p15="http://schemas.microsoft.com/office/powerpoint/2012/main" xmlns:ahyp="http://schemas.microsoft.com/office/drawing/2018/hyperlinkcolor">
+  <p:cSld>
+    <p:spTree>
+      <p:nvGrpSpPr>
+        <p:cNvPr id="188" name="Shape 188"/>
         <p:cNvGrpSpPr/>
         <p:nvPr/>
       </p:nvGrpSpPr>
@@ -9844,7 +10813,7 @@
       </p:grpSpPr>
       <p:sp>
         <p:nvSpPr>
-          <p:cNvPr id="174" name="Google Shape;174;p27"/>
+          <p:cNvPr id="189" name="Google Shape;189;p28"/>
           <p:cNvSpPr txBox="1"/>
           <p:nvPr>
             <p:ph type="title"/>
@@ -9876,7 +10845,7 @@
             </a:pPr>
             <a:r>
               <a:rPr lang="en"/>
-              <a:t>Planning and Writing the Movement Function</a:t>
+              <a:t>Adding the Sprite!</a:t>
             </a:r>
             <a:endParaRPr/>
           </a:p>
@@ -9884,7 +10853,7 @@
       </p:sp>
       <p:sp>
         <p:nvSpPr>
-          <p:cNvPr id="175" name="Google Shape;175;p27"/>
+          <p:cNvPr id="190" name="Google Shape;190;p28"/>
           <p:cNvSpPr txBox="1"/>
           <p:nvPr>
             <p:ph idx="1" type="body"/>
@@ -9901,30 +10870,29 @@
         </p:spPr>
         <p:txBody>
           <a:bodyPr anchorCtr="0" anchor="t" bIns="91425" lIns="91425" spcFirstLastPara="1" rIns="91425" wrap="square" tIns="91425">
-            <a:normAutofit/>
+            <a:normAutofit lnSpcReduction="20000"/>
           </a:bodyPr>
           <a:lstStyle/>
           <a:p>
-            <a:pPr indent="-311150" lvl="0" marL="457200" rtl="0" algn="l">
-              <a:spcBef>
-                <a:spcPts val="0"/>
-              </a:spcBef>
-              <a:spcAft>
-                <a:spcPts val="0"/>
-              </a:spcAft>
-              <a:buSzPts val="1300"/>
-              <a:buChar char="●"/>
+            <a:pPr indent="0" lvl="0" marL="0" rtl="0" algn="l">
+              <a:spcBef>
+                <a:spcPts val="0"/>
+              </a:spcBef>
+              <a:spcAft>
+                <a:spcPts val="0"/>
+              </a:spcAft>
+              <a:buNone/>
             </a:pPr>
             <a:r>
               <a:rPr lang="en"/>
-              <a:t>Discussion: Should the function that reads player input be called in _ready() or _physics_process(delta)?</a:t>
+              <a:t>We could drag and drop the sprite into the scene, but we just learned how to add nodes to a scene in Godot. </a:t>
             </a:r>
             <a:endParaRPr/>
           </a:p>
           <a:p>
             <a:pPr indent="-311150" lvl="0" marL="457200" rtl="0" algn="l">
               <a:spcBef>
-                <a:spcPts val="0"/>
+                <a:spcPts val="1200"/>
               </a:spcBef>
               <a:spcAft>
                 <a:spcPts val="0"/>
@@ -9934,7 +10902,7 @@
             </a:pPr>
             <a:r>
               <a:rPr lang="en"/>
-              <a:t>Godot reads 2D space as 2 dimensional vectors, so we can take advantage of a library called Vector2.</a:t>
+              <a:t>We’ll add a new sprite node to the scene.</a:t>
             </a:r>
             <a:endParaRPr/>
           </a:p>
@@ -9951,113 +10919,7 @@
             </a:pPr>
             <a:r>
               <a:rPr lang="en"/>
-              <a:t>We want to read the input on the X and Y planes, and calculate the movement speed of the character, then move them on the screen.</a:t>
-            </a:r>
-            <a:endParaRPr/>
-          </a:p>
-        </p:txBody>
-      </p:sp>
-    </p:spTree>
-  </p:cSld>
-  <p:clrMapOvr>
-    <a:masterClrMapping/>
-  </p:clrMapOvr>
-</p:sld>
-</file>
-
-<file path=ppt/slides/slide16.xml><?xml version="1.0" encoding="utf-8"?>
-<p:sld xmlns:a="http://schemas.openxmlformats.org/drawingml/2006/main" xmlns:r="http://schemas.openxmlformats.org/officeDocument/2006/relationships" xmlns:mc="http://schemas.openxmlformats.org/markup-compatibility/2006" xmlns:mv="urn:schemas-microsoft-com:mac:vml" xmlns:p="http://schemas.openxmlformats.org/presentationml/2006/main" xmlns:c="http://schemas.openxmlformats.org/drawingml/2006/chart" xmlns:dgm="http://schemas.openxmlformats.org/drawingml/2006/diagram" xmlns:o="urn:schemas-microsoft-com:office:office" xmlns:v="urn:schemas-microsoft-com:vml" xmlns:pvml="urn:schemas-microsoft-com:office:powerpoint" xmlns:com="http://schemas.openxmlformats.org/drawingml/2006/compatibility" xmlns:p14="http://schemas.microsoft.com/office/powerpoint/2010/main" xmlns:p15="http://schemas.microsoft.com/office/powerpoint/2012/main" xmlns:ahyp="http://schemas.microsoft.com/office/drawing/2018/hyperlinkcolor">
-  <p:cSld>
-    <p:spTree>
-      <p:nvGrpSpPr>
-        <p:cNvPr id="179" name="Shape 179"/>
-        <p:cNvGrpSpPr/>
-        <p:nvPr/>
-      </p:nvGrpSpPr>
-      <p:grpSpPr>
-        <a:xfrm>
-          <a:off x="0" y="0"/>
-          <a:ext cx="0" cy="0"/>
-          <a:chOff x="0" y="0"/>
-          <a:chExt cx="0" cy="0"/>
-        </a:xfrm>
-      </p:grpSpPr>
-      <p:sp>
-        <p:nvSpPr>
-          <p:cNvPr id="180" name="Google Shape;180;p28"/>
-          <p:cNvSpPr txBox="1"/>
-          <p:nvPr>
-            <p:ph type="title"/>
-          </p:nvPr>
-        </p:nvSpPr>
-        <p:spPr>
-          <a:xfrm>
-            <a:off x="729450" y="1318650"/>
-            <a:ext cx="7688700" cy="535200"/>
-          </a:xfrm>
-          <a:prstGeom prst="rect">
-            <a:avLst/>
-          </a:prstGeom>
-        </p:spPr>
-        <p:txBody>
-          <a:bodyPr anchorCtr="0" anchor="t" bIns="91425" lIns="91425" spcFirstLastPara="1" rIns="91425" wrap="square" tIns="91425">
-            <a:normAutofit fontScale="90000"/>
-          </a:bodyPr>
-          <a:lstStyle/>
-          <a:p>
-            <a:pPr indent="0" lvl="0" marL="0" rtl="0" algn="l">
-              <a:spcBef>
-                <a:spcPts val="0"/>
-              </a:spcBef>
-              <a:spcAft>
-                <a:spcPts val="0"/>
-              </a:spcAft>
-              <a:buNone/>
-            </a:pPr>
-            <a:r>
-              <a:rPr lang="en"/>
-              <a:t>Some general GDScript Things to Keep In Mind</a:t>
-            </a:r>
-            <a:endParaRPr/>
-          </a:p>
-        </p:txBody>
-      </p:sp>
-      <p:sp>
-        <p:nvSpPr>
-          <p:cNvPr id="181" name="Google Shape;181;p28"/>
-          <p:cNvSpPr txBox="1"/>
-          <p:nvPr>
-            <p:ph idx="1" type="body"/>
-          </p:nvPr>
-        </p:nvSpPr>
-        <p:spPr>
-          <a:xfrm>
-            <a:off x="729450" y="2078875"/>
-            <a:ext cx="7688700" cy="2261100"/>
-          </a:xfrm>
-          <a:prstGeom prst="rect">
-            <a:avLst/>
-          </a:prstGeom>
-        </p:spPr>
-        <p:txBody>
-          <a:bodyPr anchorCtr="0" anchor="t" bIns="91425" lIns="91425" spcFirstLastPara="1" rIns="91425" wrap="square" tIns="91425">
-            <a:normAutofit/>
-          </a:bodyPr>
-          <a:lstStyle/>
-          <a:p>
-            <a:pPr indent="-311150" lvl="0" marL="457200" rtl="0" algn="l">
-              <a:spcBef>
-                <a:spcPts val="0"/>
-              </a:spcBef>
-              <a:spcAft>
-                <a:spcPts val="0"/>
-              </a:spcAft>
-              <a:buSzPts val="1300"/>
-              <a:buChar char="●"/>
-            </a:pPr>
-            <a:r>
-              <a:rPr lang="en"/>
-              <a:t>If you’re creating a function definition you know you’ll need, but don’t have anything to put in it yet, you can use the pass keyword.</a:t>
+              <a:t>Adding sprites this way centers the sprite on our scene</a:t>
             </a:r>
             <a:endParaRPr/>
           </a:p>
@@ -10074,7 +10936,83 @@
             </a:pPr>
             <a:r>
               <a:rPr lang="en"/>
-              <a:t>Private variables and functions are prefaced with an underscore in Godot. </a:t>
+              <a:t>Then we select the Texture in the Assets folder for the player.</a:t>
+            </a:r>
+            <a:endParaRPr/>
+          </a:p>
+          <a:p>
+            <a:pPr indent="-311150" lvl="0" marL="457200" rtl="0" algn="l">
+              <a:spcBef>
+                <a:spcPts val="0"/>
+              </a:spcBef>
+              <a:spcAft>
+                <a:spcPts val="0"/>
+              </a:spcAft>
+              <a:buSzPts val="1300"/>
+              <a:buChar char="●"/>
+            </a:pPr>
+            <a:r>
+              <a:rPr lang="en"/>
+              <a:t>But it’s huge! That’s because the player asset is a </a:t>
+            </a:r>
+            <a:r>
+              <a:rPr i="1" lang="en"/>
+              <a:t>sprite sheet</a:t>
+            </a:r>
+            <a:r>
+              <a:rPr lang="en"/>
+              <a:t>. Which is used for animation as well, which we will get to!</a:t>
+            </a:r>
+            <a:endParaRPr/>
+          </a:p>
+          <a:p>
+            <a:pPr indent="-311150" lvl="0" marL="457200" rtl="0" algn="l">
+              <a:spcBef>
+                <a:spcPts val="0"/>
+              </a:spcBef>
+              <a:spcAft>
+                <a:spcPts val="0"/>
+              </a:spcAft>
+              <a:buSzPts val="1300"/>
+              <a:buChar char="●"/>
+            </a:pPr>
+            <a:r>
+              <a:rPr lang="en"/>
+              <a:t>We need to tell Godot to use only one frame of the sheet at a time.</a:t>
+            </a:r>
+            <a:endParaRPr/>
+          </a:p>
+          <a:p>
+            <a:pPr indent="-311150" lvl="0" marL="457200" rtl="0" algn="l">
+              <a:spcBef>
+                <a:spcPts val="0"/>
+              </a:spcBef>
+              <a:spcAft>
+                <a:spcPts val="0"/>
+              </a:spcAft>
+              <a:buSzPts val="1300"/>
+              <a:buChar char="●"/>
+            </a:pPr>
+            <a:r>
+              <a:rPr lang="en"/>
+              <a:t>On this sprite sheet, there are 60 Horizontal frames and 1 Vertical frame.</a:t>
+            </a:r>
+            <a:endParaRPr/>
+          </a:p>
+          <a:p>
+            <a:pPr indent="-311150" lvl="0" marL="457200" rtl="0" algn="l">
+              <a:spcBef>
+                <a:spcPts val="0"/>
+              </a:spcBef>
+              <a:spcAft>
+                <a:spcPts val="0"/>
+              </a:spcAft>
+              <a:buSzPts val="1300"/>
+              <a:buChar char="●"/>
+            </a:pPr>
+            <a:r>
+              <a:rPr lang="en"/>
+              <a:t>In the animation tab on the sprite node, we can set the HFrames value to 60.</a:t>
             </a:r>
             <a:endParaRPr/>
           </a:p>
@@ -10093,7 +11031,337 @@
   <p:cSld>
     <p:spTree>
       <p:nvGrpSpPr>
-        <p:cNvPr id="185" name="Shape 185"/>
+        <p:cNvPr id="194" name="Shape 194"/>
+        <p:cNvGrpSpPr/>
+        <p:nvPr/>
+      </p:nvGrpSpPr>
+      <p:grpSpPr>
+        <a:xfrm>
+          <a:off x="0" y="0"/>
+          <a:ext cx="0" cy="0"/>
+          <a:chOff x="0" y="0"/>
+          <a:chExt cx="0" cy="0"/>
+        </a:xfrm>
+      </p:grpSpPr>
+      <p:pic>
+        <p:nvPicPr>
+          <p:cNvPr id="195" name="Google Shape;195;p29"/>
+          <p:cNvPicPr preferRelativeResize="0"/>
+          <p:nvPr/>
+        </p:nvPicPr>
+        <p:blipFill>
+          <a:blip r:embed="rId3">
+            <a:alphaModFix/>
+          </a:blip>
+          <a:stretch>
+            <a:fillRect/>
+          </a:stretch>
+        </p:blipFill>
+        <p:spPr>
+          <a:xfrm>
+            <a:off x="3840075" y="685000"/>
+            <a:ext cx="4806007" cy="3629026"/>
+          </a:xfrm>
+          <a:prstGeom prst="rect">
+            <a:avLst/>
+          </a:prstGeom>
+          <a:noFill/>
+          <a:ln>
+            <a:noFill/>
+          </a:ln>
+        </p:spPr>
+      </p:pic>
+      <p:cxnSp>
+        <p:nvCxnSpPr>
+          <p:cNvPr id="196" name="Google Shape;196;p29"/>
+          <p:cNvCxnSpPr/>
+          <p:nvPr/>
+        </p:nvCxnSpPr>
+        <p:spPr>
+          <a:xfrm flipH="1" rot="10800000">
+            <a:off x="2216675" y="1572350"/>
+            <a:ext cx="1699200" cy="20400"/>
+          </a:xfrm>
+          <a:prstGeom prst="straightConnector1">
+            <a:avLst/>
+          </a:prstGeom>
+          <a:noFill/>
+          <a:ln cap="flat" cmpd="sng" w="9525">
+            <a:solidFill>
+              <a:schemeClr val="dk2"/>
+            </a:solidFill>
+            <a:prstDash val="solid"/>
+            <a:round/>
+            <a:headEnd len="med" w="med" type="none"/>
+            <a:tailEnd len="med" w="med" type="triangle"/>
+          </a:ln>
+        </p:spPr>
+      </p:cxnSp>
+      <p:sp>
+        <p:nvSpPr>
+          <p:cNvPr id="197" name="Google Shape;197;p29"/>
+          <p:cNvSpPr txBox="1"/>
+          <p:nvPr/>
+        </p:nvSpPr>
+        <p:spPr>
+          <a:xfrm>
+            <a:off x="923200" y="1131175"/>
+            <a:ext cx="989100" cy="2339700"/>
+          </a:xfrm>
+          <a:prstGeom prst="rect">
+            <a:avLst/>
+          </a:prstGeom>
+          <a:noFill/>
+          <a:ln>
+            <a:noFill/>
+          </a:ln>
+        </p:spPr>
+        <p:txBody>
+          <a:bodyPr anchorCtr="0" anchor="t" bIns="91425" lIns="91425" spcFirstLastPara="1" rIns="91425" wrap="square" tIns="91425">
+            <a:spAutoFit/>
+          </a:bodyPr>
+          <a:lstStyle/>
+          <a:p>
+            <a:pPr indent="0" lvl="0" marL="0" rtl="0" algn="l">
+              <a:spcBef>
+                <a:spcPts val="0"/>
+              </a:spcBef>
+              <a:spcAft>
+                <a:spcPts val="0"/>
+              </a:spcAft>
+              <a:buNone/>
+            </a:pPr>
+            <a:r>
+              <a:rPr lang="en">
+                <a:latin typeface="Lato"/>
+                <a:ea typeface="Lato"/>
+                <a:cs typeface="Lato"/>
+                <a:sym typeface="Lato"/>
+              </a:rPr>
+              <a:t>Add a sprite.</a:t>
+            </a:r>
+            <a:endParaRPr>
+              <a:latin typeface="Lato"/>
+              <a:ea typeface="Lato"/>
+              <a:cs typeface="Lato"/>
+              <a:sym typeface="Lato"/>
+            </a:endParaRPr>
+          </a:p>
+          <a:p>
+            <a:pPr indent="0" lvl="0" marL="0" rtl="0" algn="l">
+              <a:spcBef>
+                <a:spcPts val="0"/>
+              </a:spcBef>
+              <a:spcAft>
+                <a:spcPts val="0"/>
+              </a:spcAft>
+              <a:buNone/>
+            </a:pPr>
+            <a:br>
+              <a:rPr lang="en">
+                <a:latin typeface="Lato"/>
+                <a:ea typeface="Lato"/>
+                <a:cs typeface="Lato"/>
+                <a:sym typeface="Lato"/>
+              </a:rPr>
+            </a:br>
+            <a:r>
+              <a:rPr lang="en">
+                <a:latin typeface="Lato"/>
+                <a:ea typeface="Lato"/>
+                <a:cs typeface="Lato"/>
+                <a:sym typeface="Lato"/>
+              </a:rPr>
+              <a:t>Animated sprites are like GIFs.</a:t>
+            </a:r>
+            <a:endParaRPr>
+              <a:latin typeface="Lato"/>
+              <a:ea typeface="Lato"/>
+              <a:cs typeface="Lato"/>
+              <a:sym typeface="Lato"/>
+            </a:endParaRPr>
+          </a:p>
+          <a:p>
+            <a:pPr indent="0" lvl="0" marL="0" rtl="0" algn="l">
+              <a:spcBef>
+                <a:spcPts val="0"/>
+              </a:spcBef>
+              <a:spcAft>
+                <a:spcPts val="0"/>
+              </a:spcAft>
+              <a:buNone/>
+            </a:pPr>
+            <a:br>
+              <a:rPr lang="en">
+                <a:latin typeface="Lato"/>
+                <a:ea typeface="Lato"/>
+                <a:cs typeface="Lato"/>
+                <a:sym typeface="Lato"/>
+              </a:rPr>
+            </a:br>
+            <a:r>
+              <a:rPr lang="en">
+                <a:latin typeface="Lato"/>
+                <a:ea typeface="Lato"/>
+                <a:cs typeface="Lato"/>
+                <a:sym typeface="Lato"/>
+              </a:rPr>
+              <a:t>We want just sprite</a:t>
+            </a:r>
+            <a:endParaRPr>
+              <a:latin typeface="Lato"/>
+              <a:ea typeface="Lato"/>
+              <a:cs typeface="Lato"/>
+              <a:sym typeface="Lato"/>
+            </a:endParaRPr>
+          </a:p>
+        </p:txBody>
+      </p:sp>
+    </p:spTree>
+  </p:cSld>
+  <p:clrMapOvr>
+    <a:masterClrMapping/>
+  </p:clrMapOvr>
+</p:sld>
+</file>
+
+<file path=ppt/slides/slide18.xml><?xml version="1.0" encoding="utf-8"?>
+<p:sld xmlns:a="http://schemas.openxmlformats.org/drawingml/2006/main" xmlns:r="http://schemas.openxmlformats.org/officeDocument/2006/relationships" xmlns:mc="http://schemas.openxmlformats.org/markup-compatibility/2006" xmlns:mv="urn:schemas-microsoft-com:mac:vml" xmlns:p="http://schemas.openxmlformats.org/presentationml/2006/main" xmlns:c="http://schemas.openxmlformats.org/drawingml/2006/chart" xmlns:dgm="http://schemas.openxmlformats.org/drawingml/2006/diagram" xmlns:o="urn:schemas-microsoft-com:office:office" xmlns:v="urn:schemas-microsoft-com:vml" xmlns:pvml="urn:schemas-microsoft-com:office:powerpoint" xmlns:com="http://schemas.openxmlformats.org/drawingml/2006/compatibility" xmlns:p14="http://schemas.microsoft.com/office/powerpoint/2010/main" xmlns:p15="http://schemas.microsoft.com/office/powerpoint/2012/main" xmlns:ahyp="http://schemas.microsoft.com/office/drawing/2018/hyperlinkcolor">
+  <p:cSld>
+    <p:spTree>
+      <p:nvGrpSpPr>
+        <p:cNvPr id="201" name="Shape 201"/>
+        <p:cNvGrpSpPr/>
+        <p:nvPr/>
+      </p:nvGrpSpPr>
+      <p:grpSpPr>
+        <a:xfrm>
+          <a:off x="0" y="0"/>
+          <a:ext cx="0" cy="0"/>
+          <a:chOff x="0" y="0"/>
+          <a:chExt cx="0" cy="0"/>
+        </a:xfrm>
+      </p:grpSpPr>
+      <p:pic>
+        <p:nvPicPr>
+          <p:cNvPr id="202" name="Google Shape;202;p30"/>
+          <p:cNvPicPr preferRelativeResize="0"/>
+          <p:nvPr/>
+        </p:nvPicPr>
+        <p:blipFill>
+          <a:blip r:embed="rId3">
+            <a:alphaModFix/>
+          </a:blip>
+          <a:stretch>
+            <a:fillRect/>
+          </a:stretch>
+        </p:blipFill>
+        <p:spPr>
+          <a:xfrm>
+            <a:off x="400950" y="1141525"/>
+            <a:ext cx="4806007" cy="3629026"/>
+          </a:xfrm>
+          <a:prstGeom prst="rect">
+            <a:avLst/>
+          </a:prstGeom>
+          <a:noFill/>
+          <a:ln>
+            <a:noFill/>
+          </a:ln>
+        </p:spPr>
+      </p:pic>
+      <p:cxnSp>
+        <p:nvCxnSpPr>
+          <p:cNvPr id="203" name="Google Shape;203;p30"/>
+          <p:cNvCxnSpPr/>
+          <p:nvPr/>
+        </p:nvCxnSpPr>
+        <p:spPr>
+          <a:xfrm flipH="1">
+            <a:off x="5376725" y="2236975"/>
+            <a:ext cx="796500" cy="15300"/>
+          </a:xfrm>
+          <a:prstGeom prst="straightConnector1">
+            <a:avLst/>
+          </a:prstGeom>
+          <a:noFill/>
+          <a:ln cap="flat" cmpd="sng" w="9525">
+            <a:solidFill>
+              <a:schemeClr val="dk2"/>
+            </a:solidFill>
+            <a:prstDash val="solid"/>
+            <a:round/>
+            <a:headEnd len="med" w="med" type="none"/>
+            <a:tailEnd len="med" w="med" type="triangle"/>
+          </a:ln>
+        </p:spPr>
+      </p:cxnSp>
+      <p:sp>
+        <p:nvSpPr>
+          <p:cNvPr id="204" name="Google Shape;204;p30"/>
+          <p:cNvSpPr txBox="1"/>
+          <p:nvPr/>
+        </p:nvSpPr>
+        <p:spPr>
+          <a:xfrm>
+            <a:off x="6401475" y="1552175"/>
+            <a:ext cx="1821000" cy="615600"/>
+          </a:xfrm>
+          <a:prstGeom prst="rect">
+            <a:avLst/>
+          </a:prstGeom>
+          <a:noFill/>
+          <a:ln>
+            <a:noFill/>
+          </a:ln>
+        </p:spPr>
+        <p:txBody>
+          <a:bodyPr anchorCtr="0" anchor="t" bIns="91425" lIns="91425" spcFirstLastPara="1" rIns="91425" wrap="square" tIns="91425">
+            <a:spAutoFit/>
+          </a:bodyPr>
+          <a:lstStyle/>
+          <a:p>
+            <a:pPr indent="0" lvl="0" marL="0" rtl="0" algn="l">
+              <a:spcBef>
+                <a:spcPts val="0"/>
+              </a:spcBef>
+              <a:spcAft>
+                <a:spcPts val="0"/>
+              </a:spcAft>
+              <a:buNone/>
+            </a:pPr>
+            <a:r>
+              <a:rPr lang="en">
+                <a:latin typeface="Lato"/>
+                <a:ea typeface="Lato"/>
+                <a:cs typeface="Lato"/>
+                <a:sym typeface="Lato"/>
+              </a:rPr>
+              <a:t>We’ll search for the player art here.</a:t>
+            </a:r>
+            <a:endParaRPr>
+              <a:latin typeface="Lato"/>
+              <a:ea typeface="Lato"/>
+              <a:cs typeface="Lato"/>
+              <a:sym typeface="Lato"/>
+            </a:endParaRPr>
+          </a:p>
+        </p:txBody>
+      </p:sp>
+    </p:spTree>
+  </p:cSld>
+  <p:clrMapOvr>
+    <a:masterClrMapping/>
+  </p:clrMapOvr>
+</p:sld>
+</file>
+
+<file path=ppt/slides/slide19.xml><?xml version="1.0" encoding="utf-8"?>
+<p:sld xmlns:a="http://schemas.openxmlformats.org/drawingml/2006/main" xmlns:r="http://schemas.openxmlformats.org/officeDocument/2006/relationships" xmlns:mc="http://schemas.openxmlformats.org/markup-compatibility/2006" xmlns:mv="urn:schemas-microsoft-com:mac:vml" xmlns:p="http://schemas.openxmlformats.org/presentationml/2006/main" xmlns:c="http://schemas.openxmlformats.org/drawingml/2006/chart" xmlns:dgm="http://schemas.openxmlformats.org/drawingml/2006/diagram" xmlns:o="urn:schemas-microsoft-com:office:office" xmlns:v="urn:schemas-microsoft-com:vml" xmlns:pvml="urn:schemas-microsoft-com:office:powerpoint" xmlns:com="http://schemas.openxmlformats.org/drawingml/2006/compatibility" xmlns:p14="http://schemas.microsoft.com/office/powerpoint/2010/main" xmlns:p15="http://schemas.microsoft.com/office/powerpoint/2012/main" xmlns:ahyp="http://schemas.microsoft.com/office/drawing/2018/hyperlinkcolor">
+  <p:cSld>
+    <p:spTree>
+      <p:nvGrpSpPr>
+        <p:cNvPr id="208" name="Shape 208"/>
         <p:cNvGrpSpPr/>
         <p:nvPr/>
       </p:nvGrpSpPr>
@@ -10107,7 +11375,7 @@
       </p:grpSpPr>
       <p:sp>
         <p:nvSpPr>
-          <p:cNvPr id="186" name="Google Shape;186;p29"/>
+          <p:cNvPr id="209" name="Google Shape;209;p31"/>
           <p:cNvSpPr txBox="1"/>
           <p:nvPr>
             <p:ph type="title"/>
@@ -10139,15 +11407,7 @@
             </a:pPr>
             <a:r>
               <a:rPr lang="en"/>
-              <a:t>After </a:t>
-            </a:r>
-            <a:r>
-              <a:rPr lang="en"/>
-              <a:t>first</a:t>
-            </a:r>
-            <a:r>
-              <a:rPr lang="en"/>
-              <a:t> launch</a:t>
+              <a:t>First Lines of CODE: Scripting the Movement!</a:t>
             </a:r>
             <a:endParaRPr/>
           </a:p>
@@ -10155,7 +11415,7 @@
       </p:sp>
       <p:sp>
         <p:nvSpPr>
-          <p:cNvPr id="187" name="Google Shape;187;p29"/>
+          <p:cNvPr id="210" name="Google Shape;210;p31"/>
           <p:cNvSpPr txBox="1"/>
           <p:nvPr>
             <p:ph idx="1" type="body"/>
@@ -10188,7 +11448,15 @@
             </a:pPr>
             <a:r>
               <a:rPr lang="en"/>
-              <a:t>It looks like the Sprite is very small! This is because we forgot to do something back when we set the window size!</a:t>
+              <a:t>Godot uses a programming language called Godot Scripting </a:t>
+            </a:r>
+            <a:r>
+              <a:rPr lang="en"/>
+              <a:t>Language</a:t>
+            </a:r>
+            <a:r>
+              <a:rPr lang="en"/>
+              <a:t>, which is heavily inspired by Python.</a:t>
             </a:r>
             <a:endParaRPr/>
           </a:p>
@@ -10205,12 +11473,74 @@
             </a:pPr>
             <a:r>
               <a:rPr lang="en"/>
-              <a:t>We need to enable 2d stretch mode in the window</a:t>
+              <a:t>We can create a new script in a scene with the script icon with a plus</a:t>
+            </a:r>
+            <a:endParaRPr/>
+          </a:p>
+          <a:p>
+            <a:pPr indent="-311150" lvl="0" marL="457200" rtl="0" algn="l">
+              <a:spcBef>
+                <a:spcPts val="0"/>
+              </a:spcBef>
+              <a:spcAft>
+                <a:spcPts val="0"/>
+              </a:spcAft>
+              <a:buSzPts val="1300"/>
+              <a:buChar char="●"/>
+            </a:pPr>
+            <a:r>
+              <a:rPr lang="en"/>
+              <a:t>Godot will then ask us what kind of script we want to make, and for this project all the scripts will be GDScript.</a:t>
+            </a:r>
+            <a:endParaRPr/>
+          </a:p>
+          <a:p>
+            <a:pPr indent="-311150" lvl="0" marL="457200" rtl="0" algn="l">
+              <a:spcBef>
+                <a:spcPts val="0"/>
+              </a:spcBef>
+              <a:spcAft>
+                <a:spcPts val="0"/>
+              </a:spcAft>
+              <a:buSzPts val="1300"/>
+              <a:buChar char="●"/>
+            </a:pPr>
+            <a:r>
+              <a:rPr lang="en"/>
+              <a:t>Let’s add the Player.gd script into Source/Actors/Player/ folder.</a:t>
             </a:r>
             <a:endParaRPr/>
           </a:p>
         </p:txBody>
       </p:sp>
+      <p:pic>
+        <p:nvPicPr>
+          <p:cNvPr id="211" name="Google Shape;211;p31"/>
+          <p:cNvPicPr preferRelativeResize="0"/>
+          <p:nvPr/>
+        </p:nvPicPr>
+        <p:blipFill>
+          <a:blip r:embed="rId3">
+            <a:alphaModFix/>
+          </a:blip>
+          <a:stretch>
+            <a:fillRect/>
+          </a:stretch>
+        </p:blipFill>
+        <p:spPr>
+          <a:xfrm>
+            <a:off x="1093000" y="3529325"/>
+            <a:ext cx="3971925" cy="714375"/>
+          </a:xfrm>
+          <a:prstGeom prst="rect">
+            <a:avLst/>
+          </a:prstGeom>
+          <a:noFill/>
+          <a:ln>
+            <a:noFill/>
+          </a:ln>
+        </p:spPr>
+      </p:pic>
     </p:spTree>
   </p:cSld>
   <p:clrMapOvr>
@@ -10366,6 +11696,540 @@
           </a:ln>
         </p:spPr>
       </p:pic>
+    </p:spTree>
+  </p:cSld>
+  <p:clrMapOvr>
+    <a:masterClrMapping/>
+  </p:clrMapOvr>
+</p:sld>
+</file>
+
+<file path=ppt/slides/slide20.xml><?xml version="1.0" encoding="utf-8"?>
+<p:sld xmlns:a="http://schemas.openxmlformats.org/drawingml/2006/main" xmlns:r="http://schemas.openxmlformats.org/officeDocument/2006/relationships" xmlns:mc="http://schemas.openxmlformats.org/markup-compatibility/2006" xmlns:mv="urn:schemas-microsoft-com:mac:vml" xmlns:p="http://schemas.openxmlformats.org/presentationml/2006/main" xmlns:c="http://schemas.openxmlformats.org/drawingml/2006/chart" xmlns:dgm="http://schemas.openxmlformats.org/drawingml/2006/diagram" xmlns:o="urn:schemas-microsoft-com:office:office" xmlns:v="urn:schemas-microsoft-com:vml" xmlns:pvml="urn:schemas-microsoft-com:office:powerpoint" xmlns:com="http://schemas.openxmlformats.org/drawingml/2006/compatibility" xmlns:p14="http://schemas.microsoft.com/office/powerpoint/2010/main" xmlns:p15="http://schemas.microsoft.com/office/powerpoint/2012/main" xmlns:ahyp="http://schemas.microsoft.com/office/drawing/2018/hyperlinkcolor">
+  <p:cSld>
+    <p:spTree>
+      <p:nvGrpSpPr>
+        <p:cNvPr id="215" name="Shape 215"/>
+        <p:cNvGrpSpPr/>
+        <p:nvPr/>
+      </p:nvGrpSpPr>
+      <p:grpSpPr>
+        <a:xfrm>
+          <a:off x="0" y="0"/>
+          <a:ext cx="0" cy="0"/>
+          <a:chOff x="0" y="0"/>
+          <a:chExt cx="0" cy="0"/>
+        </a:xfrm>
+      </p:grpSpPr>
+      <p:sp>
+        <p:nvSpPr>
+          <p:cNvPr id="216" name="Google Shape;216;p32"/>
+          <p:cNvSpPr txBox="1"/>
+          <p:nvPr>
+            <p:ph type="title"/>
+          </p:nvPr>
+        </p:nvSpPr>
+        <p:spPr>
+          <a:xfrm>
+            <a:off x="729450" y="1318650"/>
+            <a:ext cx="7688700" cy="535200"/>
+          </a:xfrm>
+          <a:prstGeom prst="rect">
+            <a:avLst/>
+          </a:prstGeom>
+        </p:spPr>
+        <p:txBody>
+          <a:bodyPr anchorCtr="0" anchor="t" bIns="91425" lIns="91425" spcFirstLastPara="1" rIns="91425" wrap="square" tIns="91425">
+            <a:normAutofit fontScale="90000"/>
+          </a:bodyPr>
+          <a:lstStyle/>
+          <a:p>
+            <a:pPr indent="0" lvl="0" marL="0" rtl="0" algn="l">
+              <a:spcBef>
+                <a:spcPts val="0"/>
+              </a:spcBef>
+              <a:spcAft>
+                <a:spcPts val="0"/>
+              </a:spcAft>
+              <a:buNone/>
+            </a:pPr>
+            <a:r>
+              <a:rPr lang="en"/>
+              <a:t>The Two Primary Functions in a Godot Script</a:t>
+            </a:r>
+            <a:endParaRPr/>
+          </a:p>
+        </p:txBody>
+      </p:sp>
+      <p:sp>
+        <p:nvSpPr>
+          <p:cNvPr id="217" name="Google Shape;217;p32"/>
+          <p:cNvSpPr txBox="1"/>
+          <p:nvPr>
+            <p:ph idx="1" type="body"/>
+          </p:nvPr>
+        </p:nvSpPr>
+        <p:spPr>
+          <a:xfrm>
+            <a:off x="729450" y="2078875"/>
+            <a:ext cx="7688700" cy="2261100"/>
+          </a:xfrm>
+          <a:prstGeom prst="rect">
+            <a:avLst/>
+          </a:prstGeom>
+        </p:spPr>
+        <p:txBody>
+          <a:bodyPr anchorCtr="0" anchor="t" bIns="91425" lIns="91425" spcFirstLastPara="1" rIns="91425" wrap="square" tIns="91425">
+            <a:normAutofit/>
+          </a:bodyPr>
+          <a:lstStyle/>
+          <a:p>
+            <a:pPr indent="-311150" lvl="0" marL="457200" rtl="0" algn="l">
+              <a:spcBef>
+                <a:spcPts val="0"/>
+              </a:spcBef>
+              <a:spcAft>
+                <a:spcPts val="0"/>
+              </a:spcAft>
+              <a:buSzPts val="1300"/>
+              <a:buChar char="●"/>
+            </a:pPr>
+            <a:r>
+              <a:rPr lang="en"/>
+              <a:t>_physics_process(delta)</a:t>
+            </a:r>
+            <a:endParaRPr/>
+          </a:p>
+          <a:p>
+            <a:pPr indent="-311150" lvl="0" marL="457200" rtl="0" algn="l">
+              <a:spcBef>
+                <a:spcPts val="0"/>
+              </a:spcBef>
+              <a:spcAft>
+                <a:spcPts val="0"/>
+              </a:spcAft>
+              <a:buSzPts val="1300"/>
+              <a:buChar char="●"/>
+            </a:pPr>
+            <a:r>
+              <a:rPr lang="en"/>
+              <a:t>_ready()</a:t>
+            </a:r>
+            <a:endParaRPr/>
+          </a:p>
+          <a:p>
+            <a:pPr indent="-311150" lvl="0" marL="457200" rtl="0" algn="l">
+              <a:spcBef>
+                <a:spcPts val="0"/>
+              </a:spcBef>
+              <a:spcAft>
+                <a:spcPts val="0"/>
+              </a:spcAft>
+              <a:buSzPts val="1300"/>
+              <a:buChar char="●"/>
+            </a:pPr>
+            <a:r>
+              <a:rPr lang="en"/>
+              <a:t>What do you think these two do?</a:t>
+            </a:r>
+            <a:endParaRPr/>
+          </a:p>
+        </p:txBody>
+      </p:sp>
+    </p:spTree>
+  </p:cSld>
+  <p:clrMapOvr>
+    <a:masterClrMapping/>
+  </p:clrMapOvr>
+</p:sld>
+</file>
+
+<file path=ppt/slides/slide21.xml><?xml version="1.0" encoding="utf-8"?>
+<p:sld xmlns:a="http://schemas.openxmlformats.org/drawingml/2006/main" xmlns:r="http://schemas.openxmlformats.org/officeDocument/2006/relationships" xmlns:mc="http://schemas.openxmlformats.org/markup-compatibility/2006" xmlns:mv="urn:schemas-microsoft-com:mac:vml" xmlns:p="http://schemas.openxmlformats.org/presentationml/2006/main" xmlns:c="http://schemas.openxmlformats.org/drawingml/2006/chart" xmlns:dgm="http://schemas.openxmlformats.org/drawingml/2006/diagram" xmlns:o="urn:schemas-microsoft-com:office:office" xmlns:v="urn:schemas-microsoft-com:vml" xmlns:pvml="urn:schemas-microsoft-com:office:powerpoint" xmlns:com="http://schemas.openxmlformats.org/drawingml/2006/compatibility" xmlns:p14="http://schemas.microsoft.com/office/powerpoint/2010/main" xmlns:p15="http://schemas.microsoft.com/office/powerpoint/2012/main" xmlns:ahyp="http://schemas.microsoft.com/office/drawing/2018/hyperlinkcolor">
+  <p:cSld>
+    <p:spTree>
+      <p:nvGrpSpPr>
+        <p:cNvPr id="221" name="Shape 221"/>
+        <p:cNvGrpSpPr/>
+        <p:nvPr/>
+      </p:nvGrpSpPr>
+      <p:grpSpPr>
+        <a:xfrm>
+          <a:off x="0" y="0"/>
+          <a:ext cx="0" cy="0"/>
+          <a:chOff x="0" y="0"/>
+          <a:chExt cx="0" cy="0"/>
+        </a:xfrm>
+      </p:grpSpPr>
+      <p:sp>
+        <p:nvSpPr>
+          <p:cNvPr id="222" name="Google Shape;222;p33"/>
+          <p:cNvSpPr txBox="1"/>
+          <p:nvPr>
+            <p:ph type="title"/>
+          </p:nvPr>
+        </p:nvSpPr>
+        <p:spPr>
+          <a:xfrm>
+            <a:off x="729450" y="1318650"/>
+            <a:ext cx="7688700" cy="535200"/>
+          </a:xfrm>
+          <a:prstGeom prst="rect">
+            <a:avLst/>
+          </a:prstGeom>
+        </p:spPr>
+        <p:txBody>
+          <a:bodyPr anchorCtr="0" anchor="t" bIns="91425" lIns="91425" spcFirstLastPara="1" rIns="91425" wrap="square" tIns="91425">
+            <a:normAutofit fontScale="90000"/>
+          </a:bodyPr>
+          <a:lstStyle/>
+          <a:p>
+            <a:pPr indent="0" lvl="0" marL="0" rtl="0" algn="l">
+              <a:spcBef>
+                <a:spcPts val="0"/>
+              </a:spcBef>
+              <a:spcAft>
+                <a:spcPts val="0"/>
+              </a:spcAft>
+              <a:buNone/>
+            </a:pPr>
+            <a:r>
+              <a:rPr lang="en"/>
+              <a:t>Planning and Writing the Movement Function</a:t>
+            </a:r>
+            <a:endParaRPr/>
+          </a:p>
+        </p:txBody>
+      </p:sp>
+      <p:sp>
+        <p:nvSpPr>
+          <p:cNvPr id="223" name="Google Shape;223;p33"/>
+          <p:cNvSpPr txBox="1"/>
+          <p:nvPr>
+            <p:ph idx="1" type="body"/>
+          </p:nvPr>
+        </p:nvSpPr>
+        <p:spPr>
+          <a:xfrm>
+            <a:off x="729450" y="2078875"/>
+            <a:ext cx="7688700" cy="2261100"/>
+          </a:xfrm>
+          <a:prstGeom prst="rect">
+            <a:avLst/>
+          </a:prstGeom>
+        </p:spPr>
+        <p:txBody>
+          <a:bodyPr anchorCtr="0" anchor="t" bIns="91425" lIns="91425" spcFirstLastPara="1" rIns="91425" wrap="square" tIns="91425">
+            <a:normAutofit/>
+          </a:bodyPr>
+          <a:lstStyle/>
+          <a:p>
+            <a:pPr indent="-311150" lvl="0" marL="457200" rtl="0" algn="l">
+              <a:spcBef>
+                <a:spcPts val="0"/>
+              </a:spcBef>
+              <a:spcAft>
+                <a:spcPts val="0"/>
+              </a:spcAft>
+              <a:buSzPts val="1300"/>
+              <a:buChar char="●"/>
+            </a:pPr>
+            <a:r>
+              <a:rPr lang="en"/>
+              <a:t>Discussion: Should the function that reads player input be called in _ready() or _physics_process(delta)?</a:t>
+            </a:r>
+            <a:endParaRPr/>
+          </a:p>
+          <a:p>
+            <a:pPr indent="-311150" lvl="0" marL="457200" rtl="0" algn="l">
+              <a:spcBef>
+                <a:spcPts val="0"/>
+              </a:spcBef>
+              <a:spcAft>
+                <a:spcPts val="0"/>
+              </a:spcAft>
+              <a:buSzPts val="1300"/>
+              <a:buChar char="●"/>
+            </a:pPr>
+            <a:r>
+              <a:rPr lang="en"/>
+              <a:t>Godot reads 2D space as 2 dimensional vectors, so we can take advantage of a library called Vector2.</a:t>
+            </a:r>
+            <a:endParaRPr/>
+          </a:p>
+          <a:p>
+            <a:pPr indent="-311150" lvl="0" marL="457200" rtl="0" algn="l">
+              <a:spcBef>
+                <a:spcPts val="0"/>
+              </a:spcBef>
+              <a:spcAft>
+                <a:spcPts val="0"/>
+              </a:spcAft>
+              <a:buSzPts val="1300"/>
+              <a:buChar char="●"/>
+            </a:pPr>
+            <a:r>
+              <a:rPr lang="en"/>
+              <a:t>We want to read the input on the X and Y planes, and calculate the movement speed of the character, then move them on the screen.</a:t>
+            </a:r>
+            <a:endParaRPr/>
+          </a:p>
+        </p:txBody>
+      </p:sp>
+    </p:spTree>
+  </p:cSld>
+  <p:clrMapOvr>
+    <a:masterClrMapping/>
+  </p:clrMapOvr>
+</p:sld>
+</file>
+
+<file path=ppt/slides/slide22.xml><?xml version="1.0" encoding="utf-8"?>
+<p:sld xmlns:a="http://schemas.openxmlformats.org/drawingml/2006/main" xmlns:r="http://schemas.openxmlformats.org/officeDocument/2006/relationships" xmlns:mc="http://schemas.openxmlformats.org/markup-compatibility/2006" xmlns:mv="urn:schemas-microsoft-com:mac:vml" xmlns:p="http://schemas.openxmlformats.org/presentationml/2006/main" xmlns:c="http://schemas.openxmlformats.org/drawingml/2006/chart" xmlns:dgm="http://schemas.openxmlformats.org/drawingml/2006/diagram" xmlns:o="urn:schemas-microsoft-com:office:office" xmlns:v="urn:schemas-microsoft-com:vml" xmlns:pvml="urn:schemas-microsoft-com:office:powerpoint" xmlns:com="http://schemas.openxmlformats.org/drawingml/2006/compatibility" xmlns:p14="http://schemas.microsoft.com/office/powerpoint/2010/main" xmlns:p15="http://schemas.microsoft.com/office/powerpoint/2012/main" xmlns:ahyp="http://schemas.microsoft.com/office/drawing/2018/hyperlinkcolor">
+  <p:cSld>
+    <p:spTree>
+      <p:nvGrpSpPr>
+        <p:cNvPr id="227" name="Shape 227"/>
+        <p:cNvGrpSpPr/>
+        <p:nvPr/>
+      </p:nvGrpSpPr>
+      <p:grpSpPr>
+        <a:xfrm>
+          <a:off x="0" y="0"/>
+          <a:ext cx="0" cy="0"/>
+          <a:chOff x="0" y="0"/>
+          <a:chExt cx="0" cy="0"/>
+        </a:xfrm>
+      </p:grpSpPr>
+      <p:sp>
+        <p:nvSpPr>
+          <p:cNvPr id="228" name="Google Shape;228;p34"/>
+          <p:cNvSpPr txBox="1"/>
+          <p:nvPr>
+            <p:ph type="title"/>
+          </p:nvPr>
+        </p:nvSpPr>
+        <p:spPr>
+          <a:xfrm>
+            <a:off x="729450" y="1318650"/>
+            <a:ext cx="7688700" cy="535200"/>
+          </a:xfrm>
+          <a:prstGeom prst="rect">
+            <a:avLst/>
+          </a:prstGeom>
+        </p:spPr>
+        <p:txBody>
+          <a:bodyPr anchorCtr="0" anchor="t" bIns="91425" lIns="91425" spcFirstLastPara="1" rIns="91425" wrap="square" tIns="91425">
+            <a:normAutofit fontScale="90000"/>
+          </a:bodyPr>
+          <a:lstStyle/>
+          <a:p>
+            <a:pPr indent="0" lvl="0" marL="0" rtl="0" algn="l">
+              <a:spcBef>
+                <a:spcPts val="0"/>
+              </a:spcBef>
+              <a:spcAft>
+                <a:spcPts val="0"/>
+              </a:spcAft>
+              <a:buNone/>
+            </a:pPr>
+            <a:r>
+              <a:rPr lang="en"/>
+              <a:t>Some general GDScript Things to Keep In Mind</a:t>
+            </a:r>
+            <a:endParaRPr/>
+          </a:p>
+        </p:txBody>
+      </p:sp>
+      <p:sp>
+        <p:nvSpPr>
+          <p:cNvPr id="229" name="Google Shape;229;p34"/>
+          <p:cNvSpPr txBox="1"/>
+          <p:nvPr>
+            <p:ph idx="1" type="body"/>
+          </p:nvPr>
+        </p:nvSpPr>
+        <p:spPr>
+          <a:xfrm>
+            <a:off x="729450" y="2078875"/>
+            <a:ext cx="7688700" cy="2261100"/>
+          </a:xfrm>
+          <a:prstGeom prst="rect">
+            <a:avLst/>
+          </a:prstGeom>
+        </p:spPr>
+        <p:txBody>
+          <a:bodyPr anchorCtr="0" anchor="t" bIns="91425" lIns="91425" spcFirstLastPara="1" rIns="91425" wrap="square" tIns="91425">
+            <a:normAutofit/>
+          </a:bodyPr>
+          <a:lstStyle/>
+          <a:p>
+            <a:pPr indent="-311150" lvl="0" marL="457200" rtl="0" algn="l">
+              <a:spcBef>
+                <a:spcPts val="0"/>
+              </a:spcBef>
+              <a:spcAft>
+                <a:spcPts val="0"/>
+              </a:spcAft>
+              <a:buSzPts val="1300"/>
+              <a:buChar char="●"/>
+            </a:pPr>
+            <a:r>
+              <a:rPr lang="en"/>
+              <a:t>If you’re creating a function definition you know you’ll need, but don’t have anything to put in it yet, you can use the pass keyword.</a:t>
+            </a:r>
+            <a:endParaRPr/>
+          </a:p>
+          <a:p>
+            <a:pPr indent="-311150" lvl="0" marL="457200" rtl="0" algn="l">
+              <a:spcBef>
+                <a:spcPts val="0"/>
+              </a:spcBef>
+              <a:spcAft>
+                <a:spcPts val="0"/>
+              </a:spcAft>
+              <a:buSzPts val="1300"/>
+              <a:buChar char="●"/>
+            </a:pPr>
+            <a:r>
+              <a:rPr lang="en"/>
+              <a:t>Private variables and functions are prefaced with an underscore in Godot. </a:t>
+            </a:r>
+            <a:endParaRPr/>
+          </a:p>
+        </p:txBody>
+      </p:sp>
+    </p:spTree>
+  </p:cSld>
+  <p:clrMapOvr>
+    <a:masterClrMapping/>
+  </p:clrMapOvr>
+</p:sld>
+</file>
+
+<file path=ppt/slides/slide23.xml><?xml version="1.0" encoding="utf-8"?>
+<p:sld xmlns:a="http://schemas.openxmlformats.org/drawingml/2006/main" xmlns:r="http://schemas.openxmlformats.org/officeDocument/2006/relationships" xmlns:mc="http://schemas.openxmlformats.org/markup-compatibility/2006" xmlns:mv="urn:schemas-microsoft-com:mac:vml" xmlns:p="http://schemas.openxmlformats.org/presentationml/2006/main" xmlns:c="http://schemas.openxmlformats.org/drawingml/2006/chart" xmlns:dgm="http://schemas.openxmlformats.org/drawingml/2006/diagram" xmlns:o="urn:schemas-microsoft-com:office:office" xmlns:v="urn:schemas-microsoft-com:vml" xmlns:pvml="urn:schemas-microsoft-com:office:powerpoint" xmlns:com="http://schemas.openxmlformats.org/drawingml/2006/compatibility" xmlns:p14="http://schemas.microsoft.com/office/powerpoint/2010/main" xmlns:p15="http://schemas.microsoft.com/office/powerpoint/2012/main" xmlns:ahyp="http://schemas.microsoft.com/office/drawing/2018/hyperlinkcolor">
+  <p:cSld>
+    <p:spTree>
+      <p:nvGrpSpPr>
+        <p:cNvPr id="233" name="Shape 233"/>
+        <p:cNvGrpSpPr/>
+        <p:nvPr/>
+      </p:nvGrpSpPr>
+      <p:grpSpPr>
+        <a:xfrm>
+          <a:off x="0" y="0"/>
+          <a:ext cx="0" cy="0"/>
+          <a:chOff x="0" y="0"/>
+          <a:chExt cx="0" cy="0"/>
+        </a:xfrm>
+      </p:grpSpPr>
+      <p:sp>
+        <p:nvSpPr>
+          <p:cNvPr id="234" name="Google Shape;234;p35"/>
+          <p:cNvSpPr txBox="1"/>
+          <p:nvPr>
+            <p:ph type="title"/>
+          </p:nvPr>
+        </p:nvSpPr>
+        <p:spPr>
+          <a:xfrm>
+            <a:off x="729450" y="1318650"/>
+            <a:ext cx="7688700" cy="535200"/>
+          </a:xfrm>
+          <a:prstGeom prst="rect">
+            <a:avLst/>
+          </a:prstGeom>
+        </p:spPr>
+        <p:txBody>
+          <a:bodyPr anchorCtr="0" anchor="t" bIns="91425" lIns="91425" spcFirstLastPara="1" rIns="91425" wrap="square" tIns="91425">
+            <a:normAutofit fontScale="90000"/>
+          </a:bodyPr>
+          <a:lstStyle/>
+          <a:p>
+            <a:pPr indent="0" lvl="0" marL="0" rtl="0" algn="l">
+              <a:spcBef>
+                <a:spcPts val="0"/>
+              </a:spcBef>
+              <a:spcAft>
+                <a:spcPts val="0"/>
+              </a:spcAft>
+              <a:buNone/>
+            </a:pPr>
+            <a:r>
+              <a:rPr lang="en"/>
+              <a:t>After </a:t>
+            </a:r>
+            <a:r>
+              <a:rPr lang="en"/>
+              <a:t>first</a:t>
+            </a:r>
+            <a:r>
+              <a:rPr lang="en"/>
+              <a:t> launch</a:t>
+            </a:r>
+            <a:endParaRPr/>
+          </a:p>
+        </p:txBody>
+      </p:sp>
+      <p:sp>
+        <p:nvSpPr>
+          <p:cNvPr id="235" name="Google Shape;235;p35"/>
+          <p:cNvSpPr txBox="1"/>
+          <p:nvPr>
+            <p:ph idx="1" type="body"/>
+          </p:nvPr>
+        </p:nvSpPr>
+        <p:spPr>
+          <a:xfrm>
+            <a:off x="729450" y="2078875"/>
+            <a:ext cx="7688700" cy="2261100"/>
+          </a:xfrm>
+          <a:prstGeom prst="rect">
+            <a:avLst/>
+          </a:prstGeom>
+        </p:spPr>
+        <p:txBody>
+          <a:bodyPr anchorCtr="0" anchor="t" bIns="91425" lIns="91425" spcFirstLastPara="1" rIns="91425" wrap="square" tIns="91425">
+            <a:normAutofit/>
+          </a:bodyPr>
+          <a:lstStyle/>
+          <a:p>
+            <a:pPr indent="-311150" lvl="0" marL="457200" rtl="0" algn="l">
+              <a:spcBef>
+                <a:spcPts val="0"/>
+              </a:spcBef>
+              <a:spcAft>
+                <a:spcPts val="0"/>
+              </a:spcAft>
+              <a:buSzPts val="1300"/>
+              <a:buChar char="●"/>
+            </a:pPr>
+            <a:r>
+              <a:rPr lang="en"/>
+              <a:t>It looks like the Sprite is very small! This is because we forgot to do something back when we set the window size!</a:t>
+            </a:r>
+            <a:endParaRPr/>
+          </a:p>
+          <a:p>
+            <a:pPr indent="-311150" lvl="0" marL="457200" rtl="0" algn="l">
+              <a:spcBef>
+                <a:spcPts val="0"/>
+              </a:spcBef>
+              <a:spcAft>
+                <a:spcPts val="0"/>
+              </a:spcAft>
+              <a:buSzPts val="1300"/>
+              <a:buChar char="●"/>
+            </a:pPr>
+            <a:r>
+              <a:rPr lang="en"/>
+              <a:t>We need to enable 2d stretch mode in the window</a:t>
+            </a:r>
+            <a:endParaRPr/>
+          </a:p>
+        </p:txBody>
+      </p:sp>
     </p:spTree>
   </p:cSld>
   <p:clrMapOvr>
@@ -11579,6 +13443,285 @@
 </file>
 
 <file path=ppt/theme/theme1.xml><?xml version="1.0" encoding="utf-8"?>
+<a:theme xmlns:a="http://schemas.openxmlformats.org/drawingml/2006/main" xmlns:r="http://schemas.openxmlformats.org/officeDocument/2006/relationships" name="Streamline">
+  <a:themeElements>
+    <a:clrScheme name="Streamline">
+      <a:dk1>
+        <a:srgbClr val="1A9988"/>
+      </a:dk1>
+      <a:lt1>
+        <a:srgbClr val="FFFFFF"/>
+      </a:lt1>
+      <a:dk2>
+        <a:srgbClr val="1A1A1A"/>
+      </a:dk2>
+      <a:lt2>
+        <a:srgbClr val="E9EDEE"/>
+      </a:lt2>
+      <a:accent1>
+        <a:srgbClr val="595959"/>
+      </a:accent1>
+      <a:accent2>
+        <a:srgbClr val="6AA4C8"/>
+      </a:accent2>
+      <a:accent3>
+        <a:srgbClr val="EB5600"/>
+      </a:accent3>
+      <a:accent4>
+        <a:srgbClr val="A2FFE8"/>
+      </a:accent4>
+      <a:accent5>
+        <a:srgbClr val="1C3678"/>
+      </a:accent5>
+      <a:accent6>
+        <a:srgbClr val="FFB8A2"/>
+      </a:accent6>
+      <a:hlink>
+        <a:srgbClr val="1C3678"/>
+      </a:hlink>
+      <a:folHlink>
+        <a:srgbClr val="1C3678"/>
+      </a:folHlink>
+    </a:clrScheme>
+    <a:fontScheme name="Office">
+      <a:majorFont>
+        <a:latin typeface="Arial"/>
+        <a:ea typeface=""/>
+        <a:cs typeface=""/>
+        <a:font script="Jpan" typeface="ＭＳ Ｐゴシック"/>
+        <a:font script="Hang" typeface="맑은 고딕"/>
+        <a:font script="Hans" typeface="宋体"/>
+        <a:font script="Hant" typeface="新細明體"/>
+        <a:font script="Arab" typeface="Times New Roman"/>
+        <a:font script="Hebr" typeface="Times New Roman"/>
+        <a:font script="Thai" typeface="Angsana New"/>
+        <a:font script="Ethi" typeface="Nyala"/>
+        <a:font script="Beng" typeface="Vrinda"/>
+        <a:font script="Gujr" typeface="Shruti"/>
+        <a:font script="Khmr" typeface="MoolBoran"/>
+        <a:font script="Knda" typeface="Tunga"/>
+        <a:font script="Guru" typeface="Raavi"/>
+        <a:font script="Cans" typeface="Euphemia"/>
+        <a:font script="Cher" typeface="Plantagenet Cherokee"/>
+        <a:font script="Yiii" typeface="Microsoft Yi Baiti"/>
+        <a:font script="Tibt" typeface="Microsoft Himalaya"/>
+        <a:font script="Thaa" typeface="MV Boli"/>
+        <a:font script="Deva" typeface="Mangal"/>
+        <a:font script="Telu" typeface="Gautami"/>
+        <a:font script="Taml" typeface="Latha"/>
+        <a:font script="Syrc" typeface="Estrangelo Edessa"/>
+        <a:font script="Orya" typeface="Kalinga"/>
+        <a:font script="Mlym" typeface="Kartika"/>
+        <a:font script="Laoo" typeface="DokChampa"/>
+        <a:font script="Sinh" typeface="Iskoola Pota"/>
+        <a:font script="Mong" typeface="Mongolian Baiti"/>
+        <a:font script="Viet" typeface="Times New Roman"/>
+        <a:font script="Uigh" typeface="Microsoft Uighur"/>
+        <a:font script="Geor" typeface="Sylfaen"/>
+      </a:majorFont>
+      <a:minorFont>
+        <a:latin typeface="Arial"/>
+        <a:ea typeface=""/>
+        <a:cs typeface=""/>
+        <a:font script="Jpan" typeface="ＭＳ Ｐゴシック"/>
+        <a:font script="Hang" typeface="맑은 고딕"/>
+        <a:font script="Hans" typeface="宋体"/>
+        <a:font script="Hant" typeface="新細明體"/>
+        <a:font script="Arab" typeface="Arial"/>
+        <a:font script="Hebr" typeface="Arial"/>
+        <a:font script="Thai" typeface="Cordia New"/>
+        <a:font script="Ethi" typeface="Nyala"/>
+        <a:font script="Beng" typeface="Vrinda"/>
+        <a:font script="Gujr" typeface="Shruti"/>
+        <a:font script="Khmr" typeface="DaunPenh"/>
+        <a:font script="Knda" typeface="Tunga"/>
+        <a:font script="Guru" typeface="Raavi"/>
+        <a:font script="Cans" typeface="Euphemia"/>
+        <a:font script="Cher" typeface="Plantagenet Cherokee"/>
+        <a:font script="Yiii" typeface="Microsoft Yi Baiti"/>
+        <a:font script="Tibt" typeface="Microsoft Himalaya"/>
+        <a:font script="Thaa" typeface="MV Boli"/>
+        <a:font script="Deva" typeface="Mangal"/>
+        <a:font script="Telu" typeface="Gautami"/>
+        <a:font script="Taml" typeface="Latha"/>
+        <a:font script="Syrc" typeface="Estrangelo Edessa"/>
+        <a:font script="Orya" typeface="Kalinga"/>
+        <a:font script="Mlym" typeface="Kartika"/>
+        <a:font script="Laoo" typeface="DokChampa"/>
+        <a:font script="Sinh" typeface="Iskoola Pota"/>
+        <a:font script="Mong" typeface="Mongolian Baiti"/>
+        <a:font script="Viet" typeface="Arial"/>
+        <a:font script="Uigh" typeface="Microsoft Uighur"/>
+        <a:font script="Geor" typeface="Sylfaen"/>
+      </a:minorFont>
+    </a:fontScheme>
+    <a:fmtScheme name="Office">
+      <a:fillStyleLst>
+        <a:solidFill>
+          <a:schemeClr val="phClr"/>
+        </a:solidFill>
+        <a:gradFill rotWithShape="1">
+          <a:gsLst>
+            <a:gs pos="0">
+              <a:schemeClr val="phClr">
+                <a:tint val="50000"/>
+                <a:satMod val="300000"/>
+              </a:schemeClr>
+            </a:gs>
+            <a:gs pos="35000">
+              <a:schemeClr val="phClr">
+                <a:tint val="37000"/>
+                <a:satMod val="300000"/>
+              </a:schemeClr>
+            </a:gs>
+            <a:gs pos="100000">
+              <a:schemeClr val="phClr">
+                <a:tint val="15000"/>
+                <a:satMod val="350000"/>
+              </a:schemeClr>
+            </a:gs>
+          </a:gsLst>
+          <a:lin ang="16200000" scaled="1"/>
+        </a:gradFill>
+        <a:gradFill rotWithShape="1">
+          <a:gsLst>
+            <a:gs pos="0">
+              <a:schemeClr val="phClr">
+                <a:tint val="100000"/>
+                <a:shade val="100000"/>
+                <a:satMod val="130000"/>
+              </a:schemeClr>
+            </a:gs>
+            <a:gs pos="100000">
+              <a:schemeClr val="phClr">
+                <a:tint val="50000"/>
+                <a:shade val="100000"/>
+                <a:satMod val="350000"/>
+              </a:schemeClr>
+            </a:gs>
+          </a:gsLst>
+          <a:lin ang="16200000" scaled="0"/>
+        </a:gradFill>
+      </a:fillStyleLst>
+      <a:lnStyleLst>
+        <a:ln w="9525" cap="flat" cmpd="sng" algn="ctr">
+          <a:solidFill>
+            <a:schemeClr val="phClr">
+              <a:shade val="95000"/>
+              <a:satMod val="105000"/>
+            </a:schemeClr>
+          </a:solidFill>
+          <a:prstDash val="solid"/>
+        </a:ln>
+        <a:ln w="25400" cap="flat" cmpd="sng" algn="ctr">
+          <a:solidFill>
+            <a:schemeClr val="phClr"/>
+          </a:solidFill>
+          <a:prstDash val="solid"/>
+        </a:ln>
+        <a:ln w="38100" cap="flat" cmpd="sng" algn="ctr">
+          <a:solidFill>
+            <a:schemeClr val="phClr"/>
+          </a:solidFill>
+          <a:prstDash val="solid"/>
+        </a:ln>
+      </a:lnStyleLst>
+      <a:effectStyleLst>
+        <a:effectStyle>
+          <a:effectLst>
+            <a:outerShdw blurRad="40000" dist="20000" dir="5400000" rotWithShape="0">
+              <a:srgbClr val="000000">
+                <a:alpha val="38000"/>
+              </a:srgbClr>
+            </a:outerShdw>
+          </a:effectLst>
+        </a:effectStyle>
+        <a:effectStyle>
+          <a:effectLst>
+            <a:outerShdw blurRad="40000" dist="23000" dir="5400000" rotWithShape="0">
+              <a:srgbClr val="000000">
+                <a:alpha val="35000"/>
+              </a:srgbClr>
+            </a:outerShdw>
+          </a:effectLst>
+        </a:effectStyle>
+        <a:effectStyle>
+          <a:effectLst>
+            <a:outerShdw blurRad="40000" dist="23000" dir="5400000" rotWithShape="0">
+              <a:srgbClr val="000000">
+                <a:alpha val="35000"/>
+              </a:srgbClr>
+            </a:outerShdw>
+          </a:effectLst>
+          <a:scene3d>
+            <a:camera prst="orthographicFront">
+              <a:rot lat="0" lon="0" rev="0"/>
+            </a:camera>
+            <a:lightRig rig="threePt" dir="t">
+              <a:rot lat="0" lon="0" rev="1200000"/>
+            </a:lightRig>
+          </a:scene3d>
+          <a:sp3d>
+            <a:bevelT w="63500" h="25400"/>
+          </a:sp3d>
+        </a:effectStyle>
+      </a:effectStyleLst>
+      <a:bgFillStyleLst>
+        <a:solidFill>
+          <a:schemeClr val="phClr"/>
+        </a:solidFill>
+        <a:gradFill rotWithShape="1">
+          <a:gsLst>
+            <a:gs pos="0">
+              <a:schemeClr val="phClr">
+                <a:tint val="40000"/>
+                <a:satMod val="350000"/>
+              </a:schemeClr>
+            </a:gs>
+            <a:gs pos="40000">
+              <a:schemeClr val="phClr">
+                <a:tint val="45000"/>
+                <a:shade val="99000"/>
+                <a:satMod val="350000"/>
+              </a:schemeClr>
+            </a:gs>
+            <a:gs pos="100000">
+              <a:schemeClr val="phClr">
+                <a:shade val="20000"/>
+                <a:satMod val="255000"/>
+              </a:schemeClr>
+            </a:gs>
+          </a:gsLst>
+          <a:path path="circle">
+            <a:fillToRect l="50000" t="-80000" r="50000" b="180000"/>
+          </a:path>
+        </a:gradFill>
+        <a:gradFill rotWithShape="1">
+          <a:gsLst>
+            <a:gs pos="0">
+              <a:schemeClr val="phClr">
+                <a:tint val="80000"/>
+                <a:satMod val="300000"/>
+              </a:schemeClr>
+            </a:gs>
+            <a:gs pos="100000">
+              <a:schemeClr val="phClr">
+                <a:shade val="30000"/>
+                <a:satMod val="200000"/>
+              </a:schemeClr>
+            </a:gs>
+          </a:gsLst>
+          <a:path path="circle">
+            <a:fillToRect l="50000" t="50000" r="50000" b="50000"/>
+          </a:path>
+        </a:gradFill>
+      </a:bgFillStyleLst>
+    </a:fmtScheme>
+  </a:themeElements>
+</a:theme>
+</file>
+
+<file path=ppt/theme/theme2.xml><?xml version="1.0" encoding="utf-8"?>
 <a:theme xmlns:a="http://schemas.openxmlformats.org/drawingml/2006/main" xmlns:r="http://schemas.openxmlformats.org/officeDocument/2006/relationships">
   <a:themeElements>
     <a:clrScheme name="Default">
@@ -11855,283 +13998,4 @@
     </a:fmtScheme>
   </a:themeElements>
 </a:theme>
-</file>
-
-<file path=ppt/theme/theme2.xml><?xml version="1.0" encoding="utf-8"?>
-<a:theme xmlns:a="http://schemas.openxmlformats.org/drawingml/2006/main" xmlns:r="http://schemas.openxmlformats.org/officeDocument/2006/relationships" name="Streamline">
-  <a:themeElements>
-    <a:clrScheme name="Streamline">
-      <a:dk1>
-        <a:srgbClr val="1A9988"/>
-      </a:dk1>
-      <a:lt1>
-        <a:srgbClr val="FFFFFF"/>
-      </a:lt1>
-      <a:dk2>
-        <a:srgbClr val="1A1A1A"/>
-      </a:dk2>
-      <a:lt2>
-        <a:srgbClr val="E9EDEE"/>
-      </a:lt2>
-      <a:accent1>
-        <a:srgbClr val="595959"/>
-      </a:accent1>
-      <a:accent2>
-        <a:srgbClr val="6AA4C8"/>
-      </a:accent2>
-      <a:accent3>
-        <a:srgbClr val="EB5600"/>
-      </a:accent3>
-      <a:accent4>
-        <a:srgbClr val="A2FFE8"/>
-      </a:accent4>
-      <a:accent5>
-        <a:srgbClr val="1C3678"/>
-      </a:accent5>
-      <a:accent6>
-        <a:srgbClr val="FFB8A2"/>
-      </a:accent6>
-      <a:hlink>
-        <a:srgbClr val="1C3678"/>
-      </a:hlink>
-      <a:folHlink>
-        <a:srgbClr val="1C3678"/>
-      </a:folHlink>
-    </a:clrScheme>
-    <a:fontScheme name="Office">
-      <a:majorFont>
-        <a:latin typeface="Arial"/>
-        <a:ea typeface=""/>
-        <a:cs typeface=""/>
-        <a:font script="Jpan" typeface="ＭＳ Ｐゴシック"/>
-        <a:font script="Hang" typeface="맑은 고딕"/>
-        <a:font script="Hans" typeface="宋体"/>
-        <a:font script="Hant" typeface="新細明體"/>
-        <a:font script="Arab" typeface="Times New Roman"/>
-        <a:font script="Hebr" typeface="Times New Roman"/>
-        <a:font script="Thai" typeface="Angsana New"/>
-        <a:font script="Ethi" typeface="Nyala"/>
-        <a:font script="Beng" typeface="Vrinda"/>
-        <a:font script="Gujr" typeface="Shruti"/>
-        <a:font script="Khmr" typeface="MoolBoran"/>
-        <a:font script="Knda" typeface="Tunga"/>
-        <a:font script="Guru" typeface="Raavi"/>
-        <a:font script="Cans" typeface="Euphemia"/>
-        <a:font script="Cher" typeface="Plantagenet Cherokee"/>
-        <a:font script="Yiii" typeface="Microsoft Yi Baiti"/>
-        <a:font script="Tibt" typeface="Microsoft Himalaya"/>
-        <a:font script="Thaa" typeface="MV Boli"/>
-        <a:font script="Deva" typeface="Mangal"/>
-        <a:font script="Telu" typeface="Gautami"/>
-        <a:font script="Taml" typeface="Latha"/>
-        <a:font script="Syrc" typeface="Estrangelo Edessa"/>
-        <a:font script="Orya" typeface="Kalinga"/>
-        <a:font script="Mlym" typeface="Kartika"/>
-        <a:font script="Laoo" typeface="DokChampa"/>
-        <a:font script="Sinh" typeface="Iskoola Pota"/>
-        <a:font script="Mong" typeface="Mongolian Baiti"/>
-        <a:font script="Viet" typeface="Times New Roman"/>
-        <a:font script="Uigh" typeface="Microsoft Uighur"/>
-        <a:font script="Geor" typeface="Sylfaen"/>
-      </a:majorFont>
-      <a:minorFont>
-        <a:latin typeface="Arial"/>
-        <a:ea typeface=""/>
-        <a:cs typeface=""/>
-        <a:font script="Jpan" typeface="ＭＳ Ｐゴシック"/>
-        <a:font script="Hang" typeface="맑은 고딕"/>
-        <a:font script="Hans" typeface="宋体"/>
-        <a:font script="Hant" typeface="新細明體"/>
-        <a:font script="Arab" typeface="Arial"/>
-        <a:font script="Hebr" typeface="Arial"/>
-        <a:font script="Thai" typeface="Cordia New"/>
-        <a:font script="Ethi" typeface="Nyala"/>
-        <a:font script="Beng" typeface="Vrinda"/>
-        <a:font script="Gujr" typeface="Shruti"/>
-        <a:font script="Khmr" typeface="DaunPenh"/>
-        <a:font script="Knda" typeface="Tunga"/>
-        <a:font script="Guru" typeface="Raavi"/>
-        <a:font script="Cans" typeface="Euphemia"/>
-        <a:font script="Cher" typeface="Plantagenet Cherokee"/>
-        <a:font script="Yiii" typeface="Microsoft Yi Baiti"/>
-        <a:font script="Tibt" typeface="Microsoft Himalaya"/>
-        <a:font script="Thaa" typeface="MV Boli"/>
-        <a:font script="Deva" typeface="Mangal"/>
-        <a:font script="Telu" typeface="Gautami"/>
-        <a:font script="Taml" typeface="Latha"/>
-        <a:font script="Syrc" typeface="Estrangelo Edessa"/>
-        <a:font script="Orya" typeface="Kalinga"/>
-        <a:font script="Mlym" typeface="Kartika"/>
-        <a:font script="Laoo" typeface="DokChampa"/>
-        <a:font script="Sinh" typeface="Iskoola Pota"/>
-        <a:font script="Mong" typeface="Mongolian Baiti"/>
-        <a:font script="Viet" typeface="Arial"/>
-        <a:font script="Uigh" typeface="Microsoft Uighur"/>
-        <a:font script="Geor" typeface="Sylfaen"/>
-      </a:minorFont>
-    </a:fontScheme>
-    <a:fmtScheme name="Office">
-      <a:fillStyleLst>
-        <a:solidFill>
-          <a:schemeClr val="phClr"/>
-        </a:solidFill>
-        <a:gradFill rotWithShape="1">
-          <a:gsLst>
-            <a:gs pos="0">
-              <a:schemeClr val="phClr">
-                <a:tint val="50000"/>
-                <a:satMod val="300000"/>
-              </a:schemeClr>
-            </a:gs>
-            <a:gs pos="35000">
-              <a:schemeClr val="phClr">
-                <a:tint val="37000"/>
-                <a:satMod val="300000"/>
-              </a:schemeClr>
-            </a:gs>
-            <a:gs pos="100000">
-              <a:schemeClr val="phClr">
-                <a:tint val="15000"/>
-                <a:satMod val="350000"/>
-              </a:schemeClr>
-            </a:gs>
-          </a:gsLst>
-          <a:lin ang="16200000" scaled="1"/>
-        </a:gradFill>
-        <a:gradFill rotWithShape="1">
-          <a:gsLst>
-            <a:gs pos="0">
-              <a:schemeClr val="phClr">
-                <a:tint val="100000"/>
-                <a:shade val="100000"/>
-                <a:satMod val="130000"/>
-              </a:schemeClr>
-            </a:gs>
-            <a:gs pos="100000">
-              <a:schemeClr val="phClr">
-                <a:tint val="50000"/>
-                <a:shade val="100000"/>
-                <a:satMod val="350000"/>
-              </a:schemeClr>
-            </a:gs>
-          </a:gsLst>
-          <a:lin ang="16200000" scaled="0"/>
-        </a:gradFill>
-      </a:fillStyleLst>
-      <a:lnStyleLst>
-        <a:ln w="9525" cap="flat" cmpd="sng" algn="ctr">
-          <a:solidFill>
-            <a:schemeClr val="phClr">
-              <a:shade val="95000"/>
-              <a:satMod val="105000"/>
-            </a:schemeClr>
-          </a:solidFill>
-          <a:prstDash val="solid"/>
-        </a:ln>
-        <a:ln w="25400" cap="flat" cmpd="sng" algn="ctr">
-          <a:solidFill>
-            <a:schemeClr val="phClr"/>
-          </a:solidFill>
-          <a:prstDash val="solid"/>
-        </a:ln>
-        <a:ln w="38100" cap="flat" cmpd="sng" algn="ctr">
-          <a:solidFill>
-            <a:schemeClr val="phClr"/>
-          </a:solidFill>
-          <a:prstDash val="solid"/>
-        </a:ln>
-      </a:lnStyleLst>
-      <a:effectStyleLst>
-        <a:effectStyle>
-          <a:effectLst>
-            <a:outerShdw blurRad="40000" dist="20000" dir="5400000" rotWithShape="0">
-              <a:srgbClr val="000000">
-                <a:alpha val="38000"/>
-              </a:srgbClr>
-            </a:outerShdw>
-          </a:effectLst>
-        </a:effectStyle>
-        <a:effectStyle>
-          <a:effectLst>
-            <a:outerShdw blurRad="40000" dist="23000" dir="5400000" rotWithShape="0">
-              <a:srgbClr val="000000">
-                <a:alpha val="35000"/>
-              </a:srgbClr>
-            </a:outerShdw>
-          </a:effectLst>
-        </a:effectStyle>
-        <a:effectStyle>
-          <a:effectLst>
-            <a:outerShdw blurRad="40000" dist="23000" dir="5400000" rotWithShape="0">
-              <a:srgbClr val="000000">
-                <a:alpha val="35000"/>
-              </a:srgbClr>
-            </a:outerShdw>
-          </a:effectLst>
-          <a:scene3d>
-            <a:camera prst="orthographicFront">
-              <a:rot lat="0" lon="0" rev="0"/>
-            </a:camera>
-            <a:lightRig rig="threePt" dir="t">
-              <a:rot lat="0" lon="0" rev="1200000"/>
-            </a:lightRig>
-          </a:scene3d>
-          <a:sp3d>
-            <a:bevelT w="63500" h="25400"/>
-          </a:sp3d>
-        </a:effectStyle>
-      </a:effectStyleLst>
-      <a:bgFillStyleLst>
-        <a:solidFill>
-          <a:schemeClr val="phClr"/>
-        </a:solidFill>
-        <a:gradFill rotWithShape="1">
-          <a:gsLst>
-            <a:gs pos="0">
-              <a:schemeClr val="phClr">
-                <a:tint val="40000"/>
-                <a:satMod val="350000"/>
-              </a:schemeClr>
-            </a:gs>
-            <a:gs pos="40000">
-              <a:schemeClr val="phClr">
-                <a:tint val="45000"/>
-                <a:shade val="99000"/>
-                <a:satMod val="350000"/>
-              </a:schemeClr>
-            </a:gs>
-            <a:gs pos="100000">
-              <a:schemeClr val="phClr">
-                <a:shade val="20000"/>
-                <a:satMod val="255000"/>
-              </a:schemeClr>
-            </a:gs>
-          </a:gsLst>
-          <a:path path="circle">
-            <a:fillToRect l="50000" t="-80000" r="50000" b="180000"/>
-          </a:path>
-        </a:gradFill>
-        <a:gradFill rotWithShape="1">
-          <a:gsLst>
-            <a:gs pos="0">
-              <a:schemeClr val="phClr">
-                <a:tint val="80000"/>
-                <a:satMod val="300000"/>
-              </a:schemeClr>
-            </a:gs>
-            <a:gs pos="100000">
-              <a:schemeClr val="phClr">
-                <a:shade val="30000"/>
-                <a:satMod val="200000"/>
-              </a:schemeClr>
-            </a:gs>
-          </a:gsLst>
-          <a:path path="circle">
-            <a:fillToRect l="50000" t="50000" r="50000" b="50000"/>
-          </a:path>
-        </a:gradFill>
-      </a:bgFillStyleLst>
-    </a:fmtScheme>
-  </a:themeElements>
-</a:theme>
 </file>
</xml_diff>